<commit_message>
new slide for design patterns
</commit_message>
<xml_diff>
--- a/UWG - Code and Load - 20181127.pptx
+++ b/UWG - Code and Load - 20181127.pptx
@@ -29,7 +29,8 @@
     <p:sldId id="277" r:id="rId23"/>
     <p:sldId id="278" r:id="rId24"/>
     <p:sldId id="279" r:id="rId25"/>
-    <p:sldId id="280" r:id="rId26"/>
+    <p:sldId id="281" r:id="rId26"/>
+    <p:sldId id="280" r:id="rId27"/>
   </p:sldIdLst>
   <p:sldSz cx="12192000" cy="6858000"/>
   <p:notesSz cx="6858000" cy="9144000"/>
@@ -157,10 +158,14 @@
             <p14:sldId id="277"/>
             <p14:sldId id="278"/>
             <p14:sldId id="279"/>
+            <p14:sldId id="281"/>
             <p14:sldId id="280"/>
           </p14:sldIdLst>
         </p14:section>
       </p14:sectionLst>
+    </p:ext>
+    <p:ext uri="{EFAFB233-063F-42B5-8137-9DF3F51BA10A}">
+      <p15:sldGuideLst xmlns:p15="http://schemas.microsoft.com/office/powerpoint/2012/main"/>
     </p:ext>
   </p:extLst>
 </p:presentation>
@@ -313,7 +318,7 @@
           <a:p>
             <a:fld id="{5C94C5BA-B9DA-4B13-9282-1D02B783413C}" type="datetimeFigureOut">
               <a:rPr lang="en-US" smtClean="0"/>
-              <a:t>11/22/2018</a:t>
+              <a:t>11/23/2018</a:t>
             </a:fld>
             <a:endParaRPr lang="en-US"/>
           </a:p>
@@ -511,7 +516,7 @@
           <a:p>
             <a:fld id="{5C94C5BA-B9DA-4B13-9282-1D02B783413C}" type="datetimeFigureOut">
               <a:rPr lang="en-US" smtClean="0"/>
-              <a:t>11/22/2018</a:t>
+              <a:t>11/23/2018</a:t>
             </a:fld>
             <a:endParaRPr lang="en-US"/>
           </a:p>
@@ -719,7 +724,7 @@
           <a:p>
             <a:fld id="{5C94C5BA-B9DA-4B13-9282-1D02B783413C}" type="datetimeFigureOut">
               <a:rPr lang="en-US" smtClean="0"/>
-              <a:t>11/22/2018</a:t>
+              <a:t>11/23/2018</a:t>
             </a:fld>
             <a:endParaRPr lang="en-US"/>
           </a:p>
@@ -917,7 +922,7 @@
           <a:p>
             <a:fld id="{5C94C5BA-B9DA-4B13-9282-1D02B783413C}" type="datetimeFigureOut">
               <a:rPr lang="en-US" smtClean="0"/>
-              <a:t>11/22/2018</a:t>
+              <a:t>11/23/2018</a:t>
             </a:fld>
             <a:endParaRPr lang="en-US"/>
           </a:p>
@@ -1192,7 +1197,7 @@
           <a:p>
             <a:fld id="{5C94C5BA-B9DA-4B13-9282-1D02B783413C}" type="datetimeFigureOut">
               <a:rPr lang="en-US" smtClean="0"/>
-              <a:t>11/22/2018</a:t>
+              <a:t>11/23/2018</a:t>
             </a:fld>
             <a:endParaRPr lang="en-US"/>
           </a:p>
@@ -1457,7 +1462,7 @@
           <a:p>
             <a:fld id="{5C94C5BA-B9DA-4B13-9282-1D02B783413C}" type="datetimeFigureOut">
               <a:rPr lang="en-US" smtClean="0"/>
-              <a:t>11/22/2018</a:t>
+              <a:t>11/23/2018</a:t>
             </a:fld>
             <a:endParaRPr lang="en-US"/>
           </a:p>
@@ -1869,7 +1874,7 @@
           <a:p>
             <a:fld id="{5C94C5BA-B9DA-4B13-9282-1D02B783413C}" type="datetimeFigureOut">
               <a:rPr lang="en-US" smtClean="0"/>
-              <a:t>11/22/2018</a:t>
+              <a:t>11/23/2018</a:t>
             </a:fld>
             <a:endParaRPr lang="en-US"/>
           </a:p>
@@ -2010,7 +2015,7 @@
           <a:p>
             <a:fld id="{5C94C5BA-B9DA-4B13-9282-1D02B783413C}" type="datetimeFigureOut">
               <a:rPr lang="en-US" smtClean="0"/>
-              <a:t>11/22/2018</a:t>
+              <a:t>11/23/2018</a:t>
             </a:fld>
             <a:endParaRPr lang="en-US"/>
           </a:p>
@@ -2123,7 +2128,7 @@
           <a:p>
             <a:fld id="{5C94C5BA-B9DA-4B13-9282-1D02B783413C}" type="datetimeFigureOut">
               <a:rPr lang="en-US" smtClean="0"/>
-              <a:t>11/22/2018</a:t>
+              <a:t>11/23/2018</a:t>
             </a:fld>
             <a:endParaRPr lang="en-US"/>
           </a:p>
@@ -2434,7 +2439,7 @@
           <a:p>
             <a:fld id="{5C94C5BA-B9DA-4B13-9282-1D02B783413C}" type="datetimeFigureOut">
               <a:rPr lang="en-US" smtClean="0"/>
-              <a:t>11/22/2018</a:t>
+              <a:t>11/23/2018</a:t>
             </a:fld>
             <a:endParaRPr lang="en-US"/>
           </a:p>
@@ -2722,7 +2727,7 @@
           <a:p>
             <a:fld id="{5C94C5BA-B9DA-4B13-9282-1D02B783413C}" type="datetimeFigureOut">
               <a:rPr lang="en-US" smtClean="0"/>
-              <a:t>11/22/2018</a:t>
+              <a:t>11/23/2018</a:t>
             </a:fld>
             <a:endParaRPr lang="en-US"/>
           </a:p>
@@ -2963,7 +2968,7 @@
           <a:p>
             <a:fld id="{5C94C5BA-B9DA-4B13-9282-1D02B783413C}" type="datetimeFigureOut">
               <a:rPr lang="en-US" smtClean="0"/>
-              <a:t>11/22/2018</a:t>
+              <a:t>11/23/2018</a:t>
             </a:fld>
             <a:endParaRPr lang="en-US"/>
           </a:p>
@@ -3887,7 +3892,15 @@
             </a:r>
             <a:r>
               <a:rPr lang="en-US" dirty="0" err="1"/>
-              <a:t>Bookzilla.Models.BookSearchModel.cs</a:t>
+              <a:t>Bookzilla.Web</a:t>
+            </a:r>
+            <a:r>
+              <a:rPr lang="en-US" dirty="0"/>
+              <a:t>\Models\</a:t>
+            </a:r>
+            <a:r>
+              <a:rPr lang="en-US" dirty="0" err="1"/>
+              <a:t>BookSearchModel.cs</a:t>
             </a:r>
             <a:r>
               <a:rPr lang="en-US" dirty="0"/>
@@ -4433,297 +4446,6 @@
   <p:clrMapOvr>
     <a:masterClrMapping/>
   </p:clrMapOvr>
-  <p:timing>
-    <p:tnLst>
-      <p:par>
-        <p:cTn id="1" dur="indefinite" restart="never" nodeType="tmRoot">
-          <p:childTnLst>
-            <p:seq concurrent="1" nextAc="seek">
-              <p:cTn id="2" dur="indefinite" nodeType="mainSeq">
-                <p:childTnLst>
-                  <p:par>
-                    <p:cTn id="3" fill="hold">
-                      <p:stCondLst>
-                        <p:cond delay="indefinite"/>
-                      </p:stCondLst>
-                      <p:childTnLst>
-                        <p:par>
-                          <p:cTn id="4" fill="hold">
-                            <p:stCondLst>
-                              <p:cond delay="0"/>
-                            </p:stCondLst>
-                            <p:childTnLst>
-                              <p:par>
-                                <p:cTn id="5" presetID="1" presetClass="entr" presetSubtype="0" fill="hold" grpId="0" nodeType="clickEffect">
-                                  <p:stCondLst>
-                                    <p:cond delay="0"/>
-                                  </p:stCondLst>
-                                  <p:childTnLst>
-                                    <p:set>
-                                      <p:cBhvr>
-                                        <p:cTn id="6" dur="1" fill="hold">
-                                          <p:stCondLst>
-                                            <p:cond delay="0"/>
-                                          </p:stCondLst>
-                                        </p:cTn>
-                                        <p:tgtEl>
-                                          <p:spTgt spid="3">
-                                            <p:txEl>
-                                              <p:pRg st="0" end="0"/>
-                                            </p:txEl>
-                                          </p:spTgt>
-                                        </p:tgtEl>
-                                        <p:attrNameLst>
-                                          <p:attrName>style.visibility</p:attrName>
-                                        </p:attrNameLst>
-                                      </p:cBhvr>
-                                      <p:to>
-                                        <p:strVal val="visible"/>
-                                      </p:to>
-                                    </p:set>
-                                  </p:childTnLst>
-                                </p:cTn>
-                              </p:par>
-                              <p:par>
-                                <p:cTn id="7" presetID="1" presetClass="entr" presetSubtype="0" fill="hold" grpId="0" nodeType="withEffect">
-                                  <p:stCondLst>
-                                    <p:cond delay="0"/>
-                                  </p:stCondLst>
-                                  <p:childTnLst>
-                                    <p:set>
-                                      <p:cBhvr>
-                                        <p:cTn id="8" dur="1" fill="hold">
-                                          <p:stCondLst>
-                                            <p:cond delay="0"/>
-                                          </p:stCondLst>
-                                        </p:cTn>
-                                        <p:tgtEl>
-                                          <p:spTgt spid="3">
-                                            <p:txEl>
-                                              <p:pRg st="1" end="1"/>
-                                            </p:txEl>
-                                          </p:spTgt>
-                                        </p:tgtEl>
-                                        <p:attrNameLst>
-                                          <p:attrName>style.visibility</p:attrName>
-                                        </p:attrNameLst>
-                                      </p:cBhvr>
-                                      <p:to>
-                                        <p:strVal val="visible"/>
-                                      </p:to>
-                                    </p:set>
-                                  </p:childTnLst>
-                                </p:cTn>
-                              </p:par>
-                            </p:childTnLst>
-                          </p:cTn>
-                        </p:par>
-                      </p:childTnLst>
-                    </p:cTn>
-                  </p:par>
-                  <p:par>
-                    <p:cTn id="9" fill="hold">
-                      <p:stCondLst>
-                        <p:cond delay="indefinite"/>
-                      </p:stCondLst>
-                      <p:childTnLst>
-                        <p:par>
-                          <p:cTn id="10" fill="hold">
-                            <p:stCondLst>
-                              <p:cond delay="0"/>
-                            </p:stCondLst>
-                            <p:childTnLst>
-                              <p:par>
-                                <p:cTn id="11" presetID="1" presetClass="entr" presetSubtype="0" fill="hold" grpId="0" nodeType="clickEffect">
-                                  <p:stCondLst>
-                                    <p:cond delay="0"/>
-                                  </p:stCondLst>
-                                  <p:childTnLst>
-                                    <p:set>
-                                      <p:cBhvr>
-                                        <p:cTn id="12" dur="1" fill="hold">
-                                          <p:stCondLst>
-                                            <p:cond delay="0"/>
-                                          </p:stCondLst>
-                                        </p:cTn>
-                                        <p:tgtEl>
-                                          <p:spTgt spid="3">
-                                            <p:txEl>
-                                              <p:pRg st="2" end="2"/>
-                                            </p:txEl>
-                                          </p:spTgt>
-                                        </p:tgtEl>
-                                        <p:attrNameLst>
-                                          <p:attrName>style.visibility</p:attrName>
-                                        </p:attrNameLst>
-                                      </p:cBhvr>
-                                      <p:to>
-                                        <p:strVal val="visible"/>
-                                      </p:to>
-                                    </p:set>
-                                  </p:childTnLst>
-                                </p:cTn>
-                              </p:par>
-                              <p:par>
-                                <p:cTn id="13" presetID="1" presetClass="entr" presetSubtype="0" fill="hold" grpId="0" nodeType="withEffect">
-                                  <p:stCondLst>
-                                    <p:cond delay="0"/>
-                                  </p:stCondLst>
-                                  <p:childTnLst>
-                                    <p:set>
-                                      <p:cBhvr>
-                                        <p:cTn id="14" dur="1" fill="hold">
-                                          <p:stCondLst>
-                                            <p:cond delay="0"/>
-                                          </p:stCondLst>
-                                        </p:cTn>
-                                        <p:tgtEl>
-                                          <p:spTgt spid="3">
-                                            <p:txEl>
-                                              <p:pRg st="3" end="3"/>
-                                            </p:txEl>
-                                          </p:spTgt>
-                                        </p:tgtEl>
-                                        <p:attrNameLst>
-                                          <p:attrName>style.visibility</p:attrName>
-                                        </p:attrNameLst>
-                                      </p:cBhvr>
-                                      <p:to>
-                                        <p:strVal val="visible"/>
-                                      </p:to>
-                                    </p:set>
-                                  </p:childTnLst>
-                                </p:cTn>
-                              </p:par>
-                            </p:childTnLst>
-                          </p:cTn>
-                        </p:par>
-                      </p:childTnLst>
-                    </p:cTn>
-                  </p:par>
-                  <p:par>
-                    <p:cTn id="15" fill="hold">
-                      <p:stCondLst>
-                        <p:cond delay="indefinite"/>
-                      </p:stCondLst>
-                      <p:childTnLst>
-                        <p:par>
-                          <p:cTn id="16" fill="hold">
-                            <p:stCondLst>
-                              <p:cond delay="0"/>
-                            </p:stCondLst>
-                            <p:childTnLst>
-                              <p:par>
-                                <p:cTn id="17" presetID="1" presetClass="entr" presetSubtype="0" fill="hold" grpId="0" nodeType="clickEffect">
-                                  <p:stCondLst>
-                                    <p:cond delay="0"/>
-                                  </p:stCondLst>
-                                  <p:childTnLst>
-                                    <p:set>
-                                      <p:cBhvr>
-                                        <p:cTn id="18" dur="1" fill="hold">
-                                          <p:stCondLst>
-                                            <p:cond delay="0"/>
-                                          </p:stCondLst>
-                                        </p:cTn>
-                                        <p:tgtEl>
-                                          <p:spTgt spid="3">
-                                            <p:txEl>
-                                              <p:pRg st="4" end="4"/>
-                                            </p:txEl>
-                                          </p:spTgt>
-                                        </p:tgtEl>
-                                        <p:attrNameLst>
-                                          <p:attrName>style.visibility</p:attrName>
-                                        </p:attrNameLst>
-                                      </p:cBhvr>
-                                      <p:to>
-                                        <p:strVal val="visible"/>
-                                      </p:to>
-                                    </p:set>
-                                  </p:childTnLst>
-                                </p:cTn>
-                              </p:par>
-                            </p:childTnLst>
-                          </p:cTn>
-                        </p:par>
-                      </p:childTnLst>
-                    </p:cTn>
-                  </p:par>
-                  <p:par>
-                    <p:cTn id="19" fill="hold">
-                      <p:stCondLst>
-                        <p:cond delay="indefinite"/>
-                      </p:stCondLst>
-                      <p:childTnLst>
-                        <p:par>
-                          <p:cTn id="20" fill="hold">
-                            <p:stCondLst>
-                              <p:cond delay="0"/>
-                            </p:stCondLst>
-                            <p:childTnLst>
-                              <p:par>
-                                <p:cTn id="21" presetID="1" presetClass="entr" presetSubtype="0" fill="hold" grpId="0" nodeType="clickEffect">
-                                  <p:stCondLst>
-                                    <p:cond delay="0"/>
-                                  </p:stCondLst>
-                                  <p:childTnLst>
-                                    <p:set>
-                                      <p:cBhvr>
-                                        <p:cTn id="22" dur="1" fill="hold">
-                                          <p:stCondLst>
-                                            <p:cond delay="0"/>
-                                          </p:stCondLst>
-                                        </p:cTn>
-                                        <p:tgtEl>
-                                          <p:spTgt spid="3">
-                                            <p:txEl>
-                                              <p:pRg st="5" end="5"/>
-                                            </p:txEl>
-                                          </p:spTgt>
-                                        </p:tgtEl>
-                                        <p:attrNameLst>
-                                          <p:attrName>style.visibility</p:attrName>
-                                        </p:attrNameLst>
-                                      </p:cBhvr>
-                                      <p:to>
-                                        <p:strVal val="visible"/>
-                                      </p:to>
-                                    </p:set>
-                                  </p:childTnLst>
-                                </p:cTn>
-                              </p:par>
-                            </p:childTnLst>
-                          </p:cTn>
-                        </p:par>
-                      </p:childTnLst>
-                    </p:cTn>
-                  </p:par>
-                </p:childTnLst>
-              </p:cTn>
-              <p:prevCondLst>
-                <p:cond evt="onPrev" delay="0">
-                  <p:tgtEl>
-                    <p:sldTgt/>
-                  </p:tgtEl>
-                </p:cond>
-              </p:prevCondLst>
-              <p:nextCondLst>
-                <p:cond evt="onNext" delay="0">
-                  <p:tgtEl>
-                    <p:sldTgt/>
-                  </p:tgtEl>
-                </p:cond>
-              </p:nextCondLst>
-            </p:seq>
-          </p:childTnLst>
-        </p:cTn>
-      </p:par>
-    </p:tnLst>
-    <p:bldLst>
-      <p:bldP spid="3" grpId="0" build="p"/>
-    </p:bldLst>
-  </p:timing>
 </p:sld>
 </file>
 
@@ -4806,7 +4528,7 @@
             </a:r>
             <a:r>
               <a:rPr lang="en-US" dirty="0"/>
-              <a:t>/Models/</a:t>
+              <a:t>\Models\</a:t>
             </a:r>
             <a:r>
               <a:rPr lang="en-US" dirty="0" err="1"/>
@@ -6844,6 +6566,125 @@
           <p:cNvPr id="2" name="Title 1">
             <a:extLst>
               <a:ext uri="{FF2B5EF4-FFF2-40B4-BE49-F238E27FC236}">
+                <a16:creationId xmlns:a16="http://schemas.microsoft.com/office/drawing/2014/main" id="{0AF6FECF-EF3D-498A-9346-236855DCA4BB}"/>
+              </a:ext>
+            </a:extLst>
+          </p:cNvPr>
+          <p:cNvSpPr>
+            <a:spLocks noGrp="1"/>
+          </p:cNvSpPr>
+          <p:nvPr>
+            <p:ph type="title"/>
+          </p:nvPr>
+        </p:nvSpPr>
+        <p:spPr/>
+        <p:txBody>
+          <a:bodyPr/>
+          <a:lstStyle/>
+          <a:p>
+            <a:r>
+              <a:rPr lang="en-US" dirty="0"/>
+              <a:t>Design Patterns Used</a:t>
+            </a:r>
+          </a:p>
+        </p:txBody>
+      </p:sp>
+      <p:sp>
+        <p:nvSpPr>
+          <p:cNvPr id="3" name="Content Placeholder 2">
+            <a:extLst>
+              <a:ext uri="{FF2B5EF4-FFF2-40B4-BE49-F238E27FC236}">
+                <a16:creationId xmlns:a16="http://schemas.microsoft.com/office/drawing/2014/main" id="{E2C83D8C-9BFA-4222-B7BB-F5A22E1E1536}"/>
+              </a:ext>
+            </a:extLst>
+          </p:cNvPr>
+          <p:cNvSpPr>
+            <a:spLocks noGrp="1"/>
+          </p:cNvSpPr>
+          <p:nvPr>
+            <p:ph idx="1"/>
+          </p:nvPr>
+        </p:nvSpPr>
+        <p:spPr/>
+        <p:txBody>
+          <a:bodyPr/>
+          <a:lstStyle/>
+          <a:p>
+            <a:r>
+              <a:rPr lang="en-US" dirty="0">
+                <a:hlinkClick r:id="rId2"/>
+              </a:rPr>
+              <a:t>Model View Controller (MVC)</a:t>
+            </a:r>
+            <a:endParaRPr lang="en-US" dirty="0"/>
+          </a:p>
+          <a:p>
+            <a:r>
+              <a:rPr lang="en-US" dirty="0">
+                <a:hlinkClick r:id="rId3"/>
+              </a:rPr>
+              <a:t>Model View View-Model (MVVM)</a:t>
+            </a:r>
+            <a:endParaRPr lang="en-US" dirty="0"/>
+          </a:p>
+          <a:p>
+            <a:r>
+              <a:rPr lang="en-US" dirty="0">
+                <a:hlinkClick r:id="rId4"/>
+              </a:rPr>
+              <a:t>Data Context Interaction (DCI)</a:t>
+            </a:r>
+            <a:r>
+              <a:rPr lang="en-US" dirty="0"/>
+              <a:t> – Entity Framework</a:t>
+            </a:r>
+          </a:p>
+          <a:p>
+            <a:r>
+              <a:rPr lang="en-US" dirty="0">
+                <a:hlinkClick r:id="rId5"/>
+              </a:rPr>
+              <a:t>Data Transfer Objects (DTO)</a:t>
+            </a:r>
+            <a:endParaRPr lang="en-US" dirty="0"/>
+          </a:p>
+        </p:txBody>
+      </p:sp>
+    </p:spTree>
+    <p:extLst>
+      <p:ext uri="{BB962C8B-B14F-4D97-AF65-F5344CB8AC3E}">
+        <p14:creationId xmlns:p14="http://schemas.microsoft.com/office/powerpoint/2010/main" val="3232202499"/>
+      </p:ext>
+    </p:extLst>
+  </p:cSld>
+  <p:clrMapOvr>
+    <a:masterClrMapping/>
+  </p:clrMapOvr>
+</p:sld>
+</file>
+
+<file path=ppt/slides/slide26.xml><?xml version="1.0" encoding="utf-8"?>
+<p:sld xmlns:a="http://schemas.openxmlformats.org/drawingml/2006/main" xmlns:r="http://schemas.openxmlformats.org/officeDocument/2006/relationships" xmlns:p="http://schemas.openxmlformats.org/presentationml/2006/main">
+  <p:cSld>
+    <p:spTree>
+      <p:nvGrpSpPr>
+        <p:cNvPr id="1" name=""/>
+        <p:cNvGrpSpPr/>
+        <p:nvPr/>
+      </p:nvGrpSpPr>
+      <p:grpSpPr>
+        <a:xfrm>
+          <a:off x="0" y="0"/>
+          <a:ext cx="0" cy="0"/>
+          <a:chOff x="0" y="0"/>
+          <a:chExt cx="0" cy="0"/>
+        </a:xfrm>
+      </p:grpSpPr>
+      <p:sp>
+        <p:nvSpPr>
+          <p:cNvPr id="2" name="Title 1">
+            <a:extLst>
+              <a:ext uri="{FF2B5EF4-FFF2-40B4-BE49-F238E27FC236}">
                 <a16:creationId xmlns:a16="http://schemas.microsoft.com/office/drawing/2014/main" id="{156A40DC-BCDE-4DB1-A09F-CD7CCF36C01B}"/>
               </a:ext>
             </a:extLst>
@@ -8298,11 +8139,27 @@
             </a:r>
             <a:r>
               <a:rPr lang="en-US" dirty="0" err="1"/>
+              <a:t>Bookzilla</a:t>
+            </a:r>
+            <a:r>
+              <a:rPr lang="en-US" dirty="0"/>
+              <a:t>\</a:t>
+            </a:r>
+            <a:r>
+              <a:rPr lang="en-US" dirty="0" err="1"/>
+              <a:t>dbo</a:t>
+            </a:r>
+            <a:r>
+              <a:rPr lang="en-US" dirty="0"/>
+              <a:t>\Stored Procedures\</a:t>
+            </a:r>
+            <a:r>
+              <a:rPr lang="en-US" dirty="0" err="1"/>
               <a:t>p_BookSearch.sql</a:t>
             </a:r>
             <a:r>
               <a:rPr lang="en-US" dirty="0"/>
-              <a:t> file to also search on ISBN</a:t>
+              <a:t> file to search on ISBN</a:t>
             </a:r>
           </a:p>
           <a:p>

</xml_diff>

<commit_message>
Added agile process slide
</commit_message>
<xml_diff>
--- a/UWG - Code and Load - 20181127.pptx
+++ b/UWG - Code and Load - 20181127.pptx
@@ -8,29 +8,30 @@
     <p:sldId id="256" r:id="rId2"/>
     <p:sldId id="257" r:id="rId3"/>
     <p:sldId id="258" r:id="rId4"/>
-    <p:sldId id="259" r:id="rId5"/>
-    <p:sldId id="260" r:id="rId6"/>
-    <p:sldId id="261" r:id="rId7"/>
-    <p:sldId id="262" r:id="rId8"/>
-    <p:sldId id="263" r:id="rId9"/>
-    <p:sldId id="264" r:id="rId10"/>
-    <p:sldId id="265" r:id="rId11"/>
-    <p:sldId id="266" r:id="rId12"/>
-    <p:sldId id="267" r:id="rId13"/>
-    <p:sldId id="268" r:id="rId14"/>
-    <p:sldId id="269" r:id="rId15"/>
-    <p:sldId id="270" r:id="rId16"/>
-    <p:sldId id="271" r:id="rId17"/>
-    <p:sldId id="272" r:id="rId18"/>
-    <p:sldId id="273" r:id="rId19"/>
-    <p:sldId id="274" r:id="rId20"/>
-    <p:sldId id="275" r:id="rId21"/>
-    <p:sldId id="276" r:id="rId22"/>
-    <p:sldId id="277" r:id="rId23"/>
-    <p:sldId id="278" r:id="rId24"/>
-    <p:sldId id="279" r:id="rId25"/>
-    <p:sldId id="281" r:id="rId26"/>
-    <p:sldId id="280" r:id="rId27"/>
+    <p:sldId id="282" r:id="rId5"/>
+    <p:sldId id="259" r:id="rId6"/>
+    <p:sldId id="260" r:id="rId7"/>
+    <p:sldId id="261" r:id="rId8"/>
+    <p:sldId id="262" r:id="rId9"/>
+    <p:sldId id="263" r:id="rId10"/>
+    <p:sldId id="264" r:id="rId11"/>
+    <p:sldId id="265" r:id="rId12"/>
+    <p:sldId id="266" r:id="rId13"/>
+    <p:sldId id="267" r:id="rId14"/>
+    <p:sldId id="268" r:id="rId15"/>
+    <p:sldId id="269" r:id="rId16"/>
+    <p:sldId id="270" r:id="rId17"/>
+    <p:sldId id="271" r:id="rId18"/>
+    <p:sldId id="272" r:id="rId19"/>
+    <p:sldId id="273" r:id="rId20"/>
+    <p:sldId id="274" r:id="rId21"/>
+    <p:sldId id="275" r:id="rId22"/>
+    <p:sldId id="276" r:id="rId23"/>
+    <p:sldId id="277" r:id="rId24"/>
+    <p:sldId id="278" r:id="rId25"/>
+    <p:sldId id="279" r:id="rId26"/>
+    <p:sldId id="281" r:id="rId27"/>
+    <p:sldId id="280" r:id="rId28"/>
   </p:sldIdLst>
   <p:sldSz cx="12192000" cy="6858000"/>
   <p:notesSz cx="6858000" cy="9144000"/>
@@ -137,6 +138,7 @@
             <p14:sldId id="256"/>
             <p14:sldId id="257"/>
             <p14:sldId id="258"/>
+            <p14:sldId id="282"/>
             <p14:sldId id="259"/>
             <p14:sldId id="260"/>
             <p14:sldId id="261"/>
@@ -318,7 +320,7 @@
           <a:p>
             <a:fld id="{5C94C5BA-B9DA-4B13-9282-1D02B783413C}" type="datetimeFigureOut">
               <a:rPr lang="en-US" smtClean="0"/>
-              <a:t>11/23/2018</a:t>
+              <a:t>11/26/2018</a:t>
             </a:fld>
             <a:endParaRPr lang="en-US"/>
           </a:p>
@@ -516,7 +518,7 @@
           <a:p>
             <a:fld id="{5C94C5BA-B9DA-4B13-9282-1D02B783413C}" type="datetimeFigureOut">
               <a:rPr lang="en-US" smtClean="0"/>
-              <a:t>11/23/2018</a:t>
+              <a:t>11/26/2018</a:t>
             </a:fld>
             <a:endParaRPr lang="en-US"/>
           </a:p>
@@ -724,7 +726,7 @@
           <a:p>
             <a:fld id="{5C94C5BA-B9DA-4B13-9282-1D02B783413C}" type="datetimeFigureOut">
               <a:rPr lang="en-US" smtClean="0"/>
-              <a:t>11/23/2018</a:t>
+              <a:t>11/26/2018</a:t>
             </a:fld>
             <a:endParaRPr lang="en-US"/>
           </a:p>
@@ -922,7 +924,7 @@
           <a:p>
             <a:fld id="{5C94C5BA-B9DA-4B13-9282-1D02B783413C}" type="datetimeFigureOut">
               <a:rPr lang="en-US" smtClean="0"/>
-              <a:t>11/23/2018</a:t>
+              <a:t>11/26/2018</a:t>
             </a:fld>
             <a:endParaRPr lang="en-US"/>
           </a:p>
@@ -1197,7 +1199,7 @@
           <a:p>
             <a:fld id="{5C94C5BA-B9DA-4B13-9282-1D02B783413C}" type="datetimeFigureOut">
               <a:rPr lang="en-US" smtClean="0"/>
-              <a:t>11/23/2018</a:t>
+              <a:t>11/26/2018</a:t>
             </a:fld>
             <a:endParaRPr lang="en-US"/>
           </a:p>
@@ -1462,7 +1464,7 @@
           <a:p>
             <a:fld id="{5C94C5BA-B9DA-4B13-9282-1D02B783413C}" type="datetimeFigureOut">
               <a:rPr lang="en-US" smtClean="0"/>
-              <a:t>11/23/2018</a:t>
+              <a:t>11/26/2018</a:t>
             </a:fld>
             <a:endParaRPr lang="en-US"/>
           </a:p>
@@ -1874,7 +1876,7 @@
           <a:p>
             <a:fld id="{5C94C5BA-B9DA-4B13-9282-1D02B783413C}" type="datetimeFigureOut">
               <a:rPr lang="en-US" smtClean="0"/>
-              <a:t>11/23/2018</a:t>
+              <a:t>11/26/2018</a:t>
             </a:fld>
             <a:endParaRPr lang="en-US"/>
           </a:p>
@@ -2015,7 +2017,7 @@
           <a:p>
             <a:fld id="{5C94C5BA-B9DA-4B13-9282-1D02B783413C}" type="datetimeFigureOut">
               <a:rPr lang="en-US" smtClean="0"/>
-              <a:t>11/23/2018</a:t>
+              <a:t>11/26/2018</a:t>
             </a:fld>
             <a:endParaRPr lang="en-US"/>
           </a:p>
@@ -2128,7 +2130,7 @@
           <a:p>
             <a:fld id="{5C94C5BA-B9DA-4B13-9282-1D02B783413C}" type="datetimeFigureOut">
               <a:rPr lang="en-US" smtClean="0"/>
-              <a:t>11/23/2018</a:t>
+              <a:t>11/26/2018</a:t>
             </a:fld>
             <a:endParaRPr lang="en-US"/>
           </a:p>
@@ -2439,7 +2441,7 @@
           <a:p>
             <a:fld id="{5C94C5BA-B9DA-4B13-9282-1D02B783413C}" type="datetimeFigureOut">
               <a:rPr lang="en-US" smtClean="0"/>
-              <a:t>11/23/2018</a:t>
+              <a:t>11/26/2018</a:t>
             </a:fld>
             <a:endParaRPr lang="en-US"/>
           </a:p>
@@ -2727,7 +2729,7 @@
           <a:p>
             <a:fld id="{5C94C5BA-B9DA-4B13-9282-1D02B783413C}" type="datetimeFigureOut">
               <a:rPr lang="en-US" smtClean="0"/>
-              <a:t>11/23/2018</a:t>
+              <a:t>11/26/2018</a:t>
             </a:fld>
             <a:endParaRPr lang="en-US"/>
           </a:p>
@@ -2968,7 +2970,7 @@
           <a:p>
             <a:fld id="{5C94C5BA-B9DA-4B13-9282-1D02B783413C}" type="datetimeFigureOut">
               <a:rPr lang="en-US" smtClean="0"/>
-              <a:t>11/23/2018</a:t>
+              <a:t>11/26/2018</a:t>
             </a:fld>
             <a:endParaRPr lang="en-US"/>
           </a:p>
@@ -3490,6 +3492,442 @@
           <p:cNvPr id="2" name="Title 1">
             <a:extLst>
               <a:ext uri="{FF2B5EF4-FFF2-40B4-BE49-F238E27FC236}">
+                <a16:creationId xmlns:a16="http://schemas.microsoft.com/office/drawing/2014/main" id="{6173EB60-CCB0-43F1-8AEE-1B825B728D3F}"/>
+              </a:ext>
+            </a:extLst>
+          </p:cNvPr>
+          <p:cNvSpPr>
+            <a:spLocks noGrp="1"/>
+          </p:cNvSpPr>
+          <p:nvPr>
+            <p:ph type="title"/>
+          </p:nvPr>
+        </p:nvSpPr>
+        <p:spPr/>
+        <p:txBody>
+          <a:bodyPr/>
+          <a:lstStyle/>
+          <a:p>
+            <a:r>
+              <a:rPr lang="en-US" dirty="0"/>
+              <a:t>Book Search Needs to Search by ISBN</a:t>
+            </a:r>
+          </a:p>
+        </p:txBody>
+      </p:sp>
+      <p:sp>
+        <p:nvSpPr>
+          <p:cNvPr id="3" name="Content Placeholder 2">
+            <a:extLst>
+              <a:ext uri="{FF2B5EF4-FFF2-40B4-BE49-F238E27FC236}">
+                <a16:creationId xmlns:a16="http://schemas.microsoft.com/office/drawing/2014/main" id="{02649CE7-4E10-4A72-A51D-5317CB9ED571}"/>
+              </a:ext>
+            </a:extLst>
+          </p:cNvPr>
+          <p:cNvSpPr>
+            <a:spLocks noGrp="1"/>
+          </p:cNvSpPr>
+          <p:nvPr>
+            <p:ph idx="1"/>
+          </p:nvPr>
+        </p:nvSpPr>
+        <p:spPr/>
+        <p:txBody>
+          <a:bodyPr/>
+          <a:lstStyle/>
+          <a:p>
+            <a:r>
+              <a:rPr lang="en-US" dirty="0"/>
+              <a:t>Edit the </a:t>
+            </a:r>
+            <a:r>
+              <a:rPr lang="en-US" dirty="0" err="1"/>
+              <a:t>Bookzilla</a:t>
+            </a:r>
+            <a:r>
+              <a:rPr lang="en-US" dirty="0"/>
+              <a:t>\</a:t>
+            </a:r>
+            <a:r>
+              <a:rPr lang="en-US" dirty="0" err="1"/>
+              <a:t>dbo</a:t>
+            </a:r>
+            <a:r>
+              <a:rPr lang="en-US" dirty="0"/>
+              <a:t>\Stored Procedures\</a:t>
+            </a:r>
+            <a:r>
+              <a:rPr lang="en-US" dirty="0" err="1"/>
+              <a:t>p_BookSearch.sql</a:t>
+            </a:r>
+            <a:r>
+              <a:rPr lang="en-US" dirty="0"/>
+              <a:t> file to search on ISBN</a:t>
+            </a:r>
+          </a:p>
+          <a:p>
+            <a:r>
+              <a:rPr lang="en-US" dirty="0"/>
+              <a:t>Schema Compare the change to the database</a:t>
+            </a:r>
+          </a:p>
+          <a:p>
+            <a:pPr lvl="1"/>
+            <a:r>
+              <a:rPr lang="en-US" dirty="0" err="1"/>
+              <a:t>Bookzilla</a:t>
+            </a:r>
+            <a:r>
+              <a:rPr lang="en-US" dirty="0"/>
+              <a:t> &gt; Right-click &gt; Schema Compare</a:t>
+            </a:r>
+          </a:p>
+          <a:p>
+            <a:pPr lvl="1"/>
+            <a:r>
+              <a:rPr lang="en-US" dirty="0"/>
+              <a:t>Source: </a:t>
+            </a:r>
+            <a:r>
+              <a:rPr lang="en-US" dirty="0" err="1"/>
+              <a:t>Bookzilla</a:t>
+            </a:r>
+            <a:r>
+              <a:rPr lang="en-US" dirty="0"/>
+              <a:t> Project</a:t>
+            </a:r>
+          </a:p>
+          <a:p>
+            <a:pPr lvl="1"/>
+            <a:r>
+              <a:rPr lang="en-US" dirty="0"/>
+              <a:t>Target: </a:t>
+            </a:r>
+            <a:r>
+              <a:rPr lang="en-US" dirty="0" err="1"/>
+              <a:t>Bookzilla</a:t>
+            </a:r>
+            <a:r>
+              <a:rPr lang="en-US" dirty="0"/>
+              <a:t> Database</a:t>
+            </a:r>
+          </a:p>
+          <a:p>
+            <a:r>
+              <a:rPr lang="en-US" dirty="0"/>
+              <a:t>Test</a:t>
+            </a:r>
+          </a:p>
+        </p:txBody>
+      </p:sp>
+    </p:spTree>
+    <p:extLst>
+      <p:ext uri="{BB962C8B-B14F-4D97-AF65-F5344CB8AC3E}">
+        <p14:creationId xmlns:p14="http://schemas.microsoft.com/office/powerpoint/2010/main" val="2424050540"/>
+      </p:ext>
+    </p:extLst>
+  </p:cSld>
+  <p:clrMapOvr>
+    <a:masterClrMapping/>
+  </p:clrMapOvr>
+  <p:timing>
+    <p:tnLst>
+      <p:par>
+        <p:cTn id="1" dur="indefinite" restart="never" nodeType="tmRoot">
+          <p:childTnLst>
+            <p:seq concurrent="1" nextAc="seek">
+              <p:cTn id="2" dur="indefinite" nodeType="mainSeq">
+                <p:childTnLst>
+                  <p:par>
+                    <p:cTn id="3" fill="hold">
+                      <p:stCondLst>
+                        <p:cond delay="indefinite"/>
+                      </p:stCondLst>
+                      <p:childTnLst>
+                        <p:par>
+                          <p:cTn id="4" fill="hold">
+                            <p:stCondLst>
+                              <p:cond delay="0"/>
+                            </p:stCondLst>
+                            <p:childTnLst>
+                              <p:par>
+                                <p:cTn id="5" presetID="1" presetClass="entr" presetSubtype="0" fill="hold" grpId="0" nodeType="clickEffect">
+                                  <p:stCondLst>
+                                    <p:cond delay="0"/>
+                                  </p:stCondLst>
+                                  <p:childTnLst>
+                                    <p:set>
+                                      <p:cBhvr>
+                                        <p:cTn id="6" dur="1" fill="hold">
+                                          <p:stCondLst>
+                                            <p:cond delay="0"/>
+                                          </p:stCondLst>
+                                        </p:cTn>
+                                        <p:tgtEl>
+                                          <p:spTgt spid="3">
+                                            <p:txEl>
+                                              <p:pRg st="0" end="0"/>
+                                            </p:txEl>
+                                          </p:spTgt>
+                                        </p:tgtEl>
+                                        <p:attrNameLst>
+                                          <p:attrName>style.visibility</p:attrName>
+                                        </p:attrNameLst>
+                                      </p:cBhvr>
+                                      <p:to>
+                                        <p:strVal val="visible"/>
+                                      </p:to>
+                                    </p:set>
+                                  </p:childTnLst>
+                                </p:cTn>
+                              </p:par>
+                            </p:childTnLst>
+                          </p:cTn>
+                        </p:par>
+                      </p:childTnLst>
+                    </p:cTn>
+                  </p:par>
+                  <p:par>
+                    <p:cTn id="7" fill="hold">
+                      <p:stCondLst>
+                        <p:cond delay="indefinite"/>
+                      </p:stCondLst>
+                      <p:childTnLst>
+                        <p:par>
+                          <p:cTn id="8" fill="hold">
+                            <p:stCondLst>
+                              <p:cond delay="0"/>
+                            </p:stCondLst>
+                            <p:childTnLst>
+                              <p:par>
+                                <p:cTn id="9" presetID="1" presetClass="entr" presetSubtype="0" fill="hold" grpId="0" nodeType="clickEffect">
+                                  <p:stCondLst>
+                                    <p:cond delay="0"/>
+                                  </p:stCondLst>
+                                  <p:childTnLst>
+                                    <p:set>
+                                      <p:cBhvr>
+                                        <p:cTn id="10" dur="1" fill="hold">
+                                          <p:stCondLst>
+                                            <p:cond delay="0"/>
+                                          </p:stCondLst>
+                                        </p:cTn>
+                                        <p:tgtEl>
+                                          <p:spTgt spid="3">
+                                            <p:txEl>
+                                              <p:pRg st="1" end="1"/>
+                                            </p:txEl>
+                                          </p:spTgt>
+                                        </p:tgtEl>
+                                        <p:attrNameLst>
+                                          <p:attrName>style.visibility</p:attrName>
+                                        </p:attrNameLst>
+                                      </p:cBhvr>
+                                      <p:to>
+                                        <p:strVal val="visible"/>
+                                      </p:to>
+                                    </p:set>
+                                  </p:childTnLst>
+                                </p:cTn>
+                              </p:par>
+                              <p:par>
+                                <p:cTn id="11" presetID="1" presetClass="entr" presetSubtype="0" fill="hold" grpId="0" nodeType="withEffect">
+                                  <p:stCondLst>
+                                    <p:cond delay="0"/>
+                                  </p:stCondLst>
+                                  <p:childTnLst>
+                                    <p:set>
+                                      <p:cBhvr>
+                                        <p:cTn id="12" dur="1" fill="hold">
+                                          <p:stCondLst>
+                                            <p:cond delay="0"/>
+                                          </p:stCondLst>
+                                        </p:cTn>
+                                        <p:tgtEl>
+                                          <p:spTgt spid="3">
+                                            <p:txEl>
+                                              <p:pRg st="2" end="2"/>
+                                            </p:txEl>
+                                          </p:spTgt>
+                                        </p:tgtEl>
+                                        <p:attrNameLst>
+                                          <p:attrName>style.visibility</p:attrName>
+                                        </p:attrNameLst>
+                                      </p:cBhvr>
+                                      <p:to>
+                                        <p:strVal val="visible"/>
+                                      </p:to>
+                                    </p:set>
+                                  </p:childTnLst>
+                                </p:cTn>
+                              </p:par>
+                              <p:par>
+                                <p:cTn id="13" presetID="1" presetClass="entr" presetSubtype="0" fill="hold" grpId="0" nodeType="withEffect">
+                                  <p:stCondLst>
+                                    <p:cond delay="0"/>
+                                  </p:stCondLst>
+                                  <p:childTnLst>
+                                    <p:set>
+                                      <p:cBhvr>
+                                        <p:cTn id="14" dur="1" fill="hold">
+                                          <p:stCondLst>
+                                            <p:cond delay="0"/>
+                                          </p:stCondLst>
+                                        </p:cTn>
+                                        <p:tgtEl>
+                                          <p:spTgt spid="3">
+                                            <p:txEl>
+                                              <p:pRg st="3" end="3"/>
+                                            </p:txEl>
+                                          </p:spTgt>
+                                        </p:tgtEl>
+                                        <p:attrNameLst>
+                                          <p:attrName>style.visibility</p:attrName>
+                                        </p:attrNameLst>
+                                      </p:cBhvr>
+                                      <p:to>
+                                        <p:strVal val="visible"/>
+                                      </p:to>
+                                    </p:set>
+                                  </p:childTnLst>
+                                </p:cTn>
+                              </p:par>
+                              <p:par>
+                                <p:cTn id="15" presetID="1" presetClass="entr" presetSubtype="0" fill="hold" grpId="0" nodeType="withEffect">
+                                  <p:stCondLst>
+                                    <p:cond delay="0"/>
+                                  </p:stCondLst>
+                                  <p:childTnLst>
+                                    <p:set>
+                                      <p:cBhvr>
+                                        <p:cTn id="16" dur="1" fill="hold">
+                                          <p:stCondLst>
+                                            <p:cond delay="0"/>
+                                          </p:stCondLst>
+                                        </p:cTn>
+                                        <p:tgtEl>
+                                          <p:spTgt spid="3">
+                                            <p:txEl>
+                                              <p:pRg st="4" end="4"/>
+                                            </p:txEl>
+                                          </p:spTgt>
+                                        </p:tgtEl>
+                                        <p:attrNameLst>
+                                          <p:attrName>style.visibility</p:attrName>
+                                        </p:attrNameLst>
+                                      </p:cBhvr>
+                                      <p:to>
+                                        <p:strVal val="visible"/>
+                                      </p:to>
+                                    </p:set>
+                                  </p:childTnLst>
+                                </p:cTn>
+                              </p:par>
+                            </p:childTnLst>
+                          </p:cTn>
+                        </p:par>
+                      </p:childTnLst>
+                    </p:cTn>
+                  </p:par>
+                  <p:par>
+                    <p:cTn id="17" fill="hold">
+                      <p:stCondLst>
+                        <p:cond delay="indefinite"/>
+                      </p:stCondLst>
+                      <p:childTnLst>
+                        <p:par>
+                          <p:cTn id="18" fill="hold">
+                            <p:stCondLst>
+                              <p:cond delay="0"/>
+                            </p:stCondLst>
+                            <p:childTnLst>
+                              <p:par>
+                                <p:cTn id="19" presetID="1" presetClass="entr" presetSubtype="0" fill="hold" grpId="0" nodeType="clickEffect">
+                                  <p:stCondLst>
+                                    <p:cond delay="0"/>
+                                  </p:stCondLst>
+                                  <p:childTnLst>
+                                    <p:set>
+                                      <p:cBhvr>
+                                        <p:cTn id="20" dur="1" fill="hold">
+                                          <p:stCondLst>
+                                            <p:cond delay="0"/>
+                                          </p:stCondLst>
+                                        </p:cTn>
+                                        <p:tgtEl>
+                                          <p:spTgt spid="3">
+                                            <p:txEl>
+                                              <p:pRg st="5" end="5"/>
+                                            </p:txEl>
+                                          </p:spTgt>
+                                        </p:tgtEl>
+                                        <p:attrNameLst>
+                                          <p:attrName>style.visibility</p:attrName>
+                                        </p:attrNameLst>
+                                      </p:cBhvr>
+                                      <p:to>
+                                        <p:strVal val="visible"/>
+                                      </p:to>
+                                    </p:set>
+                                  </p:childTnLst>
+                                </p:cTn>
+                              </p:par>
+                            </p:childTnLst>
+                          </p:cTn>
+                        </p:par>
+                      </p:childTnLst>
+                    </p:cTn>
+                  </p:par>
+                </p:childTnLst>
+              </p:cTn>
+              <p:prevCondLst>
+                <p:cond evt="onPrev" delay="0">
+                  <p:tgtEl>
+                    <p:sldTgt/>
+                  </p:tgtEl>
+                </p:cond>
+              </p:prevCondLst>
+              <p:nextCondLst>
+                <p:cond evt="onNext" delay="0">
+                  <p:tgtEl>
+                    <p:sldTgt/>
+                  </p:tgtEl>
+                </p:cond>
+              </p:nextCondLst>
+            </p:seq>
+          </p:childTnLst>
+        </p:cTn>
+      </p:par>
+    </p:tnLst>
+    <p:bldLst>
+      <p:bldP spid="3" grpId="0" build="p"/>
+    </p:bldLst>
+  </p:timing>
+</p:sld>
+</file>
+
+<file path=ppt/slides/slide11.xml><?xml version="1.0" encoding="utf-8"?>
+<p:sld xmlns:a="http://schemas.openxmlformats.org/drawingml/2006/main" xmlns:r="http://schemas.openxmlformats.org/officeDocument/2006/relationships" xmlns:p="http://schemas.openxmlformats.org/presentationml/2006/main">
+  <p:cSld>
+    <p:spTree>
+      <p:nvGrpSpPr>
+        <p:cNvPr id="1" name=""/>
+        <p:cNvGrpSpPr/>
+        <p:nvPr/>
+      </p:nvGrpSpPr>
+      <p:grpSpPr>
+        <a:xfrm>
+          <a:off x="0" y="0"/>
+          <a:ext cx="0" cy="0"/>
+          <a:chOff x="0" y="0"/>
+          <a:chExt cx="0" cy="0"/>
+        </a:xfrm>
+      </p:grpSpPr>
+      <p:sp>
+        <p:nvSpPr>
+          <p:cNvPr id="2" name="Title 1">
+            <a:extLst>
+              <a:ext uri="{FF2B5EF4-FFF2-40B4-BE49-F238E27FC236}">
                 <a16:creationId xmlns:a16="http://schemas.microsoft.com/office/drawing/2014/main" id="{D7179055-5B92-4351-88A2-E863102B43AC}"/>
               </a:ext>
             </a:extLst>
@@ -3556,7 +3994,7 @@
 </p:sld>
 </file>
 
-<file path=ppt/slides/slide11.xml><?xml version="1.0" encoding="utf-8"?>
+<file path=ppt/slides/slide12.xml><?xml version="1.0" encoding="utf-8"?>
 <p:sld xmlns:a="http://schemas.openxmlformats.org/drawingml/2006/main" xmlns:r="http://schemas.openxmlformats.org/officeDocument/2006/relationships" xmlns:p="http://schemas.openxmlformats.org/presentationml/2006/main">
   <p:cSld>
     <p:spTree>
@@ -3644,7 +4082,7 @@
 </p:sld>
 </file>
 
-<file path=ppt/slides/slide12.xml><?xml version="1.0" encoding="utf-8"?>
+<file path=ppt/slides/slide13.xml><?xml version="1.0" encoding="utf-8"?>
 <p:sld xmlns:a="http://schemas.openxmlformats.org/drawingml/2006/main" xmlns:r="http://schemas.openxmlformats.org/officeDocument/2006/relationships" xmlns:p="http://schemas.openxmlformats.org/presentationml/2006/main">
   <p:cSld>
     <p:spTree>
@@ -3789,7 +4227,7 @@
 </p:sld>
 </file>
 
-<file path=ppt/slides/slide13.xml><?xml version="1.0" encoding="utf-8"?>
+<file path=ppt/slides/slide14.xml><?xml version="1.0" encoding="utf-8"?>
 <p:sld xmlns:a="http://schemas.openxmlformats.org/drawingml/2006/main" xmlns:r="http://schemas.openxmlformats.org/officeDocument/2006/relationships" xmlns:p="http://schemas.openxmlformats.org/presentationml/2006/main">
   <p:cSld>
     <p:spTree>
@@ -4310,145 +4748,6 @@
 </p:sld>
 </file>
 
-<file path=ppt/slides/slide14.xml><?xml version="1.0" encoding="utf-8"?>
-<p:sld xmlns:a="http://schemas.openxmlformats.org/drawingml/2006/main" xmlns:r="http://schemas.openxmlformats.org/officeDocument/2006/relationships" xmlns:p="http://schemas.openxmlformats.org/presentationml/2006/main">
-  <p:cSld>
-    <p:spTree>
-      <p:nvGrpSpPr>
-        <p:cNvPr id="1" name=""/>
-        <p:cNvGrpSpPr/>
-        <p:nvPr/>
-      </p:nvGrpSpPr>
-      <p:grpSpPr>
-        <a:xfrm>
-          <a:off x="0" y="0"/>
-          <a:ext cx="0" cy="0"/>
-          <a:chOff x="0" y="0"/>
-          <a:chExt cx="0" cy="0"/>
-        </a:xfrm>
-      </p:grpSpPr>
-      <p:sp>
-        <p:nvSpPr>
-          <p:cNvPr id="2" name="Title 1">
-            <a:extLst>
-              <a:ext uri="{FF2B5EF4-FFF2-40B4-BE49-F238E27FC236}">
-                <a16:creationId xmlns:a16="http://schemas.microsoft.com/office/drawing/2014/main" id="{213EC139-E06A-44EA-B977-3F44B5C2BB77}"/>
-              </a:ext>
-            </a:extLst>
-          </p:cNvPr>
-          <p:cNvSpPr>
-            <a:spLocks noGrp="1"/>
-          </p:cNvSpPr>
-          <p:nvPr>
-            <p:ph type="title"/>
-          </p:nvPr>
-        </p:nvSpPr>
-        <p:spPr/>
-        <p:txBody>
-          <a:bodyPr/>
-          <a:lstStyle/>
-          <a:p>
-            <a:r>
-              <a:rPr lang="en-US" dirty="0"/>
-              <a:t>Update the </a:t>
-            </a:r>
-            <a:r>
-              <a:rPr lang="en-US" dirty="0" err="1"/>
-              <a:t>p_BookSearch</a:t>
-            </a:r>
-            <a:endParaRPr lang="en-US" dirty="0"/>
-          </a:p>
-        </p:txBody>
-      </p:sp>
-      <p:sp>
-        <p:nvSpPr>
-          <p:cNvPr id="3" name="Content Placeholder 2">
-            <a:extLst>
-              <a:ext uri="{FF2B5EF4-FFF2-40B4-BE49-F238E27FC236}">
-                <a16:creationId xmlns:a16="http://schemas.microsoft.com/office/drawing/2014/main" id="{8028FE59-E712-4FEB-A1A4-94FC65E62DB0}"/>
-              </a:ext>
-            </a:extLst>
-          </p:cNvPr>
-          <p:cNvSpPr>
-            <a:spLocks noGrp="1"/>
-          </p:cNvSpPr>
-          <p:nvPr>
-            <p:ph idx="1"/>
-          </p:nvPr>
-        </p:nvSpPr>
-        <p:spPr/>
-        <p:txBody>
-          <a:bodyPr/>
-          <a:lstStyle/>
-          <a:p>
-            <a:r>
-              <a:rPr lang="en-US" dirty="0"/>
-              <a:t>Add parameter</a:t>
-            </a:r>
-          </a:p>
-          <a:p>
-            <a:pPr lvl="1"/>
-            <a:r>
-              <a:rPr lang="en-US" dirty="0">
-                <a:latin typeface="Consolas" panose="020B0609020204030204" pitchFamily="49" charset="0"/>
-              </a:rPr>
-              <a:t>@SHOW_IN_STOCK_ONLY bit = 1</a:t>
-            </a:r>
-          </a:p>
-          <a:p>
-            <a:r>
-              <a:rPr lang="en-US" dirty="0"/>
-              <a:t>Add to where clause</a:t>
-            </a:r>
-          </a:p>
-          <a:p>
-            <a:pPr lvl="1"/>
-            <a:r>
-              <a:rPr lang="en-US" dirty="0">
-                <a:latin typeface="Consolas" panose="020B0609020204030204" pitchFamily="49" charset="0"/>
-              </a:rPr>
-              <a:t>(</a:t>
-            </a:r>
-            <a:r>
-              <a:rPr lang="en-US" dirty="0" err="1">
-                <a:latin typeface="Consolas" panose="020B0609020204030204" pitchFamily="49" charset="0"/>
-              </a:rPr>
-              <a:t>i.QUANTITY_IN_STOCK</a:t>
-            </a:r>
-            <a:r>
-              <a:rPr lang="en-US" dirty="0">
-                <a:latin typeface="Consolas" panose="020B0609020204030204" pitchFamily="49" charset="0"/>
-              </a:rPr>
-              <a:t> &gt; 0 or @SHOW_IN_STOCK_ONLY = 0)</a:t>
-            </a:r>
-          </a:p>
-          <a:p>
-            <a:r>
-              <a:rPr lang="en-US" dirty="0"/>
-              <a:t>Think about the order of operations in the where clause</a:t>
-            </a:r>
-          </a:p>
-          <a:p>
-            <a:r>
-              <a:rPr lang="en-US" dirty="0"/>
-              <a:t>Schema Compare to the database</a:t>
-            </a:r>
-          </a:p>
-        </p:txBody>
-      </p:sp>
-    </p:spTree>
-    <p:extLst>
-      <p:ext uri="{BB962C8B-B14F-4D97-AF65-F5344CB8AC3E}">
-        <p14:creationId xmlns:p14="http://schemas.microsoft.com/office/powerpoint/2010/main" val="2250259280"/>
-      </p:ext>
-    </p:extLst>
-  </p:cSld>
-  <p:clrMapOvr>
-    <a:masterClrMapping/>
-  </p:clrMapOvr>
-</p:sld>
-</file>
-
 <file path=ppt/slides/slide15.xml><?xml version="1.0" encoding="utf-8"?>
 <p:sld xmlns:a="http://schemas.openxmlformats.org/drawingml/2006/main" xmlns:r="http://schemas.openxmlformats.org/officeDocument/2006/relationships" xmlns:p="http://schemas.openxmlformats.org/presentationml/2006/main">
   <p:cSld>
@@ -4471,6 +4770,145 @@
           <p:cNvPr id="2" name="Title 1">
             <a:extLst>
               <a:ext uri="{FF2B5EF4-FFF2-40B4-BE49-F238E27FC236}">
+                <a16:creationId xmlns:a16="http://schemas.microsoft.com/office/drawing/2014/main" id="{213EC139-E06A-44EA-B977-3F44B5C2BB77}"/>
+              </a:ext>
+            </a:extLst>
+          </p:cNvPr>
+          <p:cNvSpPr>
+            <a:spLocks noGrp="1"/>
+          </p:cNvSpPr>
+          <p:nvPr>
+            <p:ph type="title"/>
+          </p:nvPr>
+        </p:nvSpPr>
+        <p:spPr/>
+        <p:txBody>
+          <a:bodyPr/>
+          <a:lstStyle/>
+          <a:p>
+            <a:r>
+              <a:rPr lang="en-US" dirty="0"/>
+              <a:t>Update the </a:t>
+            </a:r>
+            <a:r>
+              <a:rPr lang="en-US" dirty="0" err="1"/>
+              <a:t>p_BookSearch</a:t>
+            </a:r>
+            <a:endParaRPr lang="en-US" dirty="0"/>
+          </a:p>
+        </p:txBody>
+      </p:sp>
+      <p:sp>
+        <p:nvSpPr>
+          <p:cNvPr id="3" name="Content Placeholder 2">
+            <a:extLst>
+              <a:ext uri="{FF2B5EF4-FFF2-40B4-BE49-F238E27FC236}">
+                <a16:creationId xmlns:a16="http://schemas.microsoft.com/office/drawing/2014/main" id="{8028FE59-E712-4FEB-A1A4-94FC65E62DB0}"/>
+              </a:ext>
+            </a:extLst>
+          </p:cNvPr>
+          <p:cNvSpPr>
+            <a:spLocks noGrp="1"/>
+          </p:cNvSpPr>
+          <p:nvPr>
+            <p:ph idx="1"/>
+          </p:nvPr>
+        </p:nvSpPr>
+        <p:spPr/>
+        <p:txBody>
+          <a:bodyPr/>
+          <a:lstStyle/>
+          <a:p>
+            <a:r>
+              <a:rPr lang="en-US" dirty="0"/>
+              <a:t>Add parameter</a:t>
+            </a:r>
+          </a:p>
+          <a:p>
+            <a:pPr lvl="1"/>
+            <a:r>
+              <a:rPr lang="en-US" dirty="0">
+                <a:latin typeface="Consolas" panose="020B0609020204030204" pitchFamily="49" charset="0"/>
+              </a:rPr>
+              <a:t>@SHOW_IN_STOCK_ONLY bit = 1</a:t>
+            </a:r>
+          </a:p>
+          <a:p>
+            <a:r>
+              <a:rPr lang="en-US" dirty="0"/>
+              <a:t>Add to where clause</a:t>
+            </a:r>
+          </a:p>
+          <a:p>
+            <a:pPr lvl="1"/>
+            <a:r>
+              <a:rPr lang="en-US" dirty="0">
+                <a:latin typeface="Consolas" panose="020B0609020204030204" pitchFamily="49" charset="0"/>
+              </a:rPr>
+              <a:t>(</a:t>
+            </a:r>
+            <a:r>
+              <a:rPr lang="en-US" dirty="0" err="1">
+                <a:latin typeface="Consolas" panose="020B0609020204030204" pitchFamily="49" charset="0"/>
+              </a:rPr>
+              <a:t>i.QUANTITY_IN_STOCK</a:t>
+            </a:r>
+            <a:r>
+              <a:rPr lang="en-US" dirty="0">
+                <a:latin typeface="Consolas" panose="020B0609020204030204" pitchFamily="49" charset="0"/>
+              </a:rPr>
+              <a:t> &gt; 0 or @SHOW_IN_STOCK_ONLY = 0)</a:t>
+            </a:r>
+          </a:p>
+          <a:p>
+            <a:r>
+              <a:rPr lang="en-US" dirty="0"/>
+              <a:t>Think about the order of operations in the where clause</a:t>
+            </a:r>
+          </a:p>
+          <a:p>
+            <a:r>
+              <a:rPr lang="en-US" dirty="0"/>
+              <a:t>Schema Compare to the database</a:t>
+            </a:r>
+          </a:p>
+        </p:txBody>
+      </p:sp>
+    </p:spTree>
+    <p:extLst>
+      <p:ext uri="{BB962C8B-B14F-4D97-AF65-F5344CB8AC3E}">
+        <p14:creationId xmlns:p14="http://schemas.microsoft.com/office/powerpoint/2010/main" val="2250259280"/>
+      </p:ext>
+    </p:extLst>
+  </p:cSld>
+  <p:clrMapOvr>
+    <a:masterClrMapping/>
+  </p:clrMapOvr>
+</p:sld>
+</file>
+
+<file path=ppt/slides/slide16.xml><?xml version="1.0" encoding="utf-8"?>
+<p:sld xmlns:a="http://schemas.openxmlformats.org/drawingml/2006/main" xmlns:r="http://schemas.openxmlformats.org/officeDocument/2006/relationships" xmlns:p="http://schemas.openxmlformats.org/presentationml/2006/main">
+  <p:cSld>
+    <p:spTree>
+      <p:nvGrpSpPr>
+        <p:cNvPr id="1" name=""/>
+        <p:cNvGrpSpPr/>
+        <p:nvPr/>
+      </p:nvGrpSpPr>
+      <p:grpSpPr>
+        <a:xfrm>
+          <a:off x="0" y="0"/>
+          <a:ext cx="0" cy="0"/>
+          <a:chOff x="0" y="0"/>
+          <a:chExt cx="0" cy="0"/>
+        </a:xfrm>
+      </p:grpSpPr>
+      <p:sp>
+        <p:nvSpPr>
+          <p:cNvPr id="2" name="Title 1">
+            <a:extLst>
+              <a:ext uri="{FF2B5EF4-FFF2-40B4-BE49-F238E27FC236}">
                 <a16:creationId xmlns:a16="http://schemas.microsoft.com/office/drawing/2014/main" id="{C28587B4-8CF4-4BA8-8FA3-39175FC876A0}"/>
               </a:ext>
             </a:extLst>
@@ -4575,7 +5013,7 @@
 </p:sld>
 </file>
 
-<file path=ppt/slides/slide16.xml><?xml version="1.0" encoding="utf-8"?>
+<file path=ppt/slides/slide17.xml><?xml version="1.0" encoding="utf-8"?>
 <p:sld xmlns:a="http://schemas.openxmlformats.org/drawingml/2006/main" xmlns:r="http://schemas.openxmlformats.org/officeDocument/2006/relationships" xmlns:p="http://schemas.openxmlformats.org/presentationml/2006/main">
   <p:cSld>
     <p:spTree>
@@ -4663,7 +5101,7 @@
 </p:sld>
 </file>
 
-<file path=ppt/slides/slide17.xml><?xml version="1.0" encoding="utf-8"?>
+<file path=ppt/slides/slide18.xml><?xml version="1.0" encoding="utf-8"?>
 <p:sld xmlns:a="http://schemas.openxmlformats.org/drawingml/2006/main" xmlns:r="http://schemas.openxmlformats.org/officeDocument/2006/relationships" xmlns:p="http://schemas.openxmlformats.org/presentationml/2006/main">
   <p:cSld>
     <p:spTree>
@@ -4751,7 +5189,7 @@
 </p:sld>
 </file>
 
-<file path=ppt/slides/slide18.xml><?xml version="1.0" encoding="utf-8"?>
+<file path=ppt/slides/slide19.xml><?xml version="1.0" encoding="utf-8"?>
 <p:sld xmlns:a="http://schemas.openxmlformats.org/drawingml/2006/main" xmlns:r="http://schemas.openxmlformats.org/officeDocument/2006/relationships" xmlns:p="http://schemas.openxmlformats.org/presentationml/2006/main">
   <p:cSld>
     <p:spTree>
@@ -4864,298 +5302,6 @@
   <p:clrMapOvr>
     <a:masterClrMapping/>
   </p:clrMapOvr>
-</p:sld>
-</file>
-
-<file path=ppt/slides/slide19.xml><?xml version="1.0" encoding="utf-8"?>
-<p:sld xmlns:a="http://schemas.openxmlformats.org/drawingml/2006/main" xmlns:r="http://schemas.openxmlformats.org/officeDocument/2006/relationships" xmlns:p="http://schemas.openxmlformats.org/presentationml/2006/main">
-  <p:cSld>
-    <p:spTree>
-      <p:nvGrpSpPr>
-        <p:cNvPr id="1" name=""/>
-        <p:cNvGrpSpPr/>
-        <p:nvPr/>
-      </p:nvGrpSpPr>
-      <p:grpSpPr>
-        <a:xfrm>
-          <a:off x="0" y="0"/>
-          <a:ext cx="0" cy="0"/>
-          <a:chOff x="0" y="0"/>
-          <a:chExt cx="0" cy="0"/>
-        </a:xfrm>
-      </p:grpSpPr>
-      <p:sp>
-        <p:nvSpPr>
-          <p:cNvPr id="2" name="Title 1">
-            <a:extLst>
-              <a:ext uri="{FF2B5EF4-FFF2-40B4-BE49-F238E27FC236}">
-                <a16:creationId xmlns:a16="http://schemas.microsoft.com/office/drawing/2014/main" id="{CC56CFF4-9630-427F-B2B7-791293543A2D}"/>
-              </a:ext>
-            </a:extLst>
-          </p:cNvPr>
-          <p:cNvSpPr>
-            <a:spLocks noGrp="1"/>
-          </p:cNvSpPr>
-          <p:nvPr>
-            <p:ph type="title"/>
-          </p:nvPr>
-        </p:nvSpPr>
-        <p:spPr/>
-        <p:txBody>
-          <a:bodyPr/>
-          <a:lstStyle/>
-          <a:p>
-            <a:r>
-              <a:rPr lang="en-US" dirty="0"/>
-              <a:t>Update </a:t>
-            </a:r>
-            <a:r>
-              <a:rPr lang="en-US" dirty="0" err="1"/>
-              <a:t>BookSearchModel</a:t>
-            </a:r>
-            <a:endParaRPr lang="en-US" dirty="0"/>
-          </a:p>
-        </p:txBody>
-      </p:sp>
-      <p:sp>
-        <p:nvSpPr>
-          <p:cNvPr id="3" name="Content Placeholder 2">
-            <a:extLst>
-              <a:ext uri="{FF2B5EF4-FFF2-40B4-BE49-F238E27FC236}">
-                <a16:creationId xmlns:a16="http://schemas.microsoft.com/office/drawing/2014/main" id="{431C0E6D-79A5-4A67-A476-8186B9CD7C96}"/>
-              </a:ext>
-            </a:extLst>
-          </p:cNvPr>
-          <p:cNvSpPr>
-            <a:spLocks noGrp="1"/>
-          </p:cNvSpPr>
-          <p:nvPr>
-            <p:ph idx="1"/>
-          </p:nvPr>
-        </p:nvSpPr>
-        <p:spPr/>
-        <p:txBody>
-          <a:bodyPr/>
-          <a:lstStyle/>
-          <a:p>
-            <a:r>
-              <a:rPr lang="en-US" dirty="0"/>
-              <a:t>Add a new property to </a:t>
-            </a:r>
-            <a:r>
-              <a:rPr lang="en-US" dirty="0" err="1"/>
-              <a:t>Bookzilla.Web</a:t>
-            </a:r>
-            <a:r>
-              <a:rPr lang="en-US" dirty="0"/>
-              <a:t>\Models\</a:t>
-            </a:r>
-            <a:r>
-              <a:rPr lang="en-US" dirty="0" err="1"/>
-              <a:t>BookSearchModel.cs</a:t>
-            </a:r>
-            <a:endParaRPr lang="en-US" dirty="0"/>
-          </a:p>
-          <a:p>
-            <a:pPr lvl="1"/>
-            <a:r>
-              <a:rPr lang="en-US" dirty="0"/>
-              <a:t> public bool </a:t>
-            </a:r>
-            <a:r>
-              <a:rPr lang="en-US" dirty="0" err="1"/>
-              <a:t>InStockOnly</a:t>
-            </a:r>
-            <a:r>
-              <a:rPr lang="en-US" dirty="0"/>
-              <a:t> { get; set; } = true;</a:t>
-            </a:r>
-          </a:p>
-          <a:p>
-            <a:r>
-              <a:rPr lang="en-US" dirty="0"/>
-              <a:t>Pass the new property as the second parameter to the </a:t>
-            </a:r>
-            <a:r>
-              <a:rPr lang="en-US" dirty="0" err="1"/>
-              <a:t>p_BookSearch</a:t>
-            </a:r>
-            <a:endParaRPr lang="en-US" dirty="0"/>
-          </a:p>
-        </p:txBody>
-      </p:sp>
-    </p:spTree>
-    <p:extLst>
-      <p:ext uri="{BB962C8B-B14F-4D97-AF65-F5344CB8AC3E}">
-        <p14:creationId xmlns:p14="http://schemas.microsoft.com/office/powerpoint/2010/main" val="741218323"/>
-      </p:ext>
-    </p:extLst>
-  </p:cSld>
-  <p:clrMapOvr>
-    <a:masterClrMapping/>
-  </p:clrMapOvr>
-  <p:timing>
-    <p:tnLst>
-      <p:par>
-        <p:cTn id="1" dur="indefinite" restart="never" nodeType="tmRoot">
-          <p:childTnLst>
-            <p:seq concurrent="1" nextAc="seek">
-              <p:cTn id="2" dur="indefinite" nodeType="mainSeq">
-                <p:childTnLst>
-                  <p:par>
-                    <p:cTn id="3" fill="hold">
-                      <p:stCondLst>
-                        <p:cond delay="indefinite"/>
-                      </p:stCondLst>
-                      <p:childTnLst>
-                        <p:par>
-                          <p:cTn id="4" fill="hold">
-                            <p:stCondLst>
-                              <p:cond delay="0"/>
-                            </p:stCondLst>
-                            <p:childTnLst>
-                              <p:par>
-                                <p:cTn id="5" presetID="1" presetClass="entr" presetSubtype="0" fill="hold" grpId="0" nodeType="clickEffect">
-                                  <p:stCondLst>
-                                    <p:cond delay="0"/>
-                                  </p:stCondLst>
-                                  <p:childTnLst>
-                                    <p:set>
-                                      <p:cBhvr>
-                                        <p:cTn id="6" dur="1" fill="hold">
-                                          <p:stCondLst>
-                                            <p:cond delay="0"/>
-                                          </p:stCondLst>
-                                        </p:cTn>
-                                        <p:tgtEl>
-                                          <p:spTgt spid="3">
-                                            <p:txEl>
-                                              <p:pRg st="0" end="0"/>
-                                            </p:txEl>
-                                          </p:spTgt>
-                                        </p:tgtEl>
-                                        <p:attrNameLst>
-                                          <p:attrName>style.visibility</p:attrName>
-                                        </p:attrNameLst>
-                                      </p:cBhvr>
-                                      <p:to>
-                                        <p:strVal val="visible"/>
-                                      </p:to>
-                                    </p:set>
-                                  </p:childTnLst>
-                                </p:cTn>
-                              </p:par>
-                              <p:par>
-                                <p:cTn id="7" presetID="1" presetClass="entr" presetSubtype="0" fill="hold" grpId="0" nodeType="withEffect">
-                                  <p:stCondLst>
-                                    <p:cond delay="0"/>
-                                  </p:stCondLst>
-                                  <p:childTnLst>
-                                    <p:set>
-                                      <p:cBhvr>
-                                        <p:cTn id="8" dur="1" fill="hold">
-                                          <p:stCondLst>
-                                            <p:cond delay="0"/>
-                                          </p:stCondLst>
-                                        </p:cTn>
-                                        <p:tgtEl>
-                                          <p:spTgt spid="3">
-                                            <p:txEl>
-                                              <p:pRg st="1" end="1"/>
-                                            </p:txEl>
-                                          </p:spTgt>
-                                        </p:tgtEl>
-                                        <p:attrNameLst>
-                                          <p:attrName>style.visibility</p:attrName>
-                                        </p:attrNameLst>
-                                      </p:cBhvr>
-                                      <p:to>
-                                        <p:strVal val="visible"/>
-                                      </p:to>
-                                    </p:set>
-                                  </p:childTnLst>
-                                </p:cTn>
-                              </p:par>
-                            </p:childTnLst>
-                          </p:cTn>
-                        </p:par>
-                      </p:childTnLst>
-                    </p:cTn>
-                  </p:par>
-                  <p:par>
-                    <p:cTn id="9" fill="hold">
-                      <p:stCondLst>
-                        <p:cond delay="indefinite"/>
-                      </p:stCondLst>
-                      <p:childTnLst>
-                        <p:par>
-                          <p:cTn id="10" fill="hold">
-                            <p:stCondLst>
-                              <p:cond delay="0"/>
-                            </p:stCondLst>
-                            <p:childTnLst>
-                              <p:par>
-                                <p:cTn id="11" presetID="1" presetClass="entr" presetSubtype="0" fill="hold" grpId="0" nodeType="clickEffect">
-                                  <p:stCondLst>
-                                    <p:cond delay="0"/>
-                                  </p:stCondLst>
-                                  <p:childTnLst>
-                                    <p:set>
-                                      <p:cBhvr>
-                                        <p:cTn id="12" dur="1" fill="hold">
-                                          <p:stCondLst>
-                                            <p:cond delay="0"/>
-                                          </p:stCondLst>
-                                        </p:cTn>
-                                        <p:tgtEl>
-                                          <p:spTgt spid="3">
-                                            <p:txEl>
-                                              <p:pRg st="2" end="2"/>
-                                            </p:txEl>
-                                          </p:spTgt>
-                                        </p:tgtEl>
-                                        <p:attrNameLst>
-                                          <p:attrName>style.visibility</p:attrName>
-                                        </p:attrNameLst>
-                                      </p:cBhvr>
-                                      <p:to>
-                                        <p:strVal val="visible"/>
-                                      </p:to>
-                                    </p:set>
-                                  </p:childTnLst>
-                                </p:cTn>
-                              </p:par>
-                            </p:childTnLst>
-                          </p:cTn>
-                        </p:par>
-                      </p:childTnLst>
-                    </p:cTn>
-                  </p:par>
-                </p:childTnLst>
-              </p:cTn>
-              <p:prevCondLst>
-                <p:cond evt="onPrev" delay="0">
-                  <p:tgtEl>
-                    <p:sldTgt/>
-                  </p:tgtEl>
-                </p:cond>
-              </p:prevCondLst>
-              <p:nextCondLst>
-                <p:cond evt="onNext" delay="0">
-                  <p:tgtEl>
-                    <p:sldTgt/>
-                  </p:tgtEl>
-                </p:cond>
-              </p:nextCondLst>
-            </p:seq>
-          </p:childTnLst>
-        </p:cTn>
-      </p:par>
-    </p:tnLst>
-    <p:bldLst>
-      <p:bldP spid="3" grpId="0" build="p"/>
-    </p:bldLst>
-  </p:timing>
 </p:sld>
 </file>
 
@@ -5578,6 +5724,298 @@
           <p:cNvPr id="2" name="Title 1">
             <a:extLst>
               <a:ext uri="{FF2B5EF4-FFF2-40B4-BE49-F238E27FC236}">
+                <a16:creationId xmlns:a16="http://schemas.microsoft.com/office/drawing/2014/main" id="{CC56CFF4-9630-427F-B2B7-791293543A2D}"/>
+              </a:ext>
+            </a:extLst>
+          </p:cNvPr>
+          <p:cNvSpPr>
+            <a:spLocks noGrp="1"/>
+          </p:cNvSpPr>
+          <p:nvPr>
+            <p:ph type="title"/>
+          </p:nvPr>
+        </p:nvSpPr>
+        <p:spPr/>
+        <p:txBody>
+          <a:bodyPr/>
+          <a:lstStyle/>
+          <a:p>
+            <a:r>
+              <a:rPr lang="en-US" dirty="0"/>
+              <a:t>Update </a:t>
+            </a:r>
+            <a:r>
+              <a:rPr lang="en-US" dirty="0" err="1"/>
+              <a:t>BookSearchModel</a:t>
+            </a:r>
+            <a:endParaRPr lang="en-US" dirty="0"/>
+          </a:p>
+        </p:txBody>
+      </p:sp>
+      <p:sp>
+        <p:nvSpPr>
+          <p:cNvPr id="3" name="Content Placeholder 2">
+            <a:extLst>
+              <a:ext uri="{FF2B5EF4-FFF2-40B4-BE49-F238E27FC236}">
+                <a16:creationId xmlns:a16="http://schemas.microsoft.com/office/drawing/2014/main" id="{431C0E6D-79A5-4A67-A476-8186B9CD7C96}"/>
+              </a:ext>
+            </a:extLst>
+          </p:cNvPr>
+          <p:cNvSpPr>
+            <a:spLocks noGrp="1"/>
+          </p:cNvSpPr>
+          <p:nvPr>
+            <p:ph idx="1"/>
+          </p:nvPr>
+        </p:nvSpPr>
+        <p:spPr/>
+        <p:txBody>
+          <a:bodyPr/>
+          <a:lstStyle/>
+          <a:p>
+            <a:r>
+              <a:rPr lang="en-US" dirty="0"/>
+              <a:t>Add a new property to </a:t>
+            </a:r>
+            <a:r>
+              <a:rPr lang="en-US" dirty="0" err="1"/>
+              <a:t>Bookzilla.Web</a:t>
+            </a:r>
+            <a:r>
+              <a:rPr lang="en-US" dirty="0"/>
+              <a:t>\Models\</a:t>
+            </a:r>
+            <a:r>
+              <a:rPr lang="en-US" dirty="0" err="1"/>
+              <a:t>BookSearchModel.cs</a:t>
+            </a:r>
+            <a:endParaRPr lang="en-US" dirty="0"/>
+          </a:p>
+          <a:p>
+            <a:pPr lvl="1"/>
+            <a:r>
+              <a:rPr lang="en-US" dirty="0"/>
+              <a:t> public bool </a:t>
+            </a:r>
+            <a:r>
+              <a:rPr lang="en-US" dirty="0" err="1"/>
+              <a:t>InStockOnly</a:t>
+            </a:r>
+            <a:r>
+              <a:rPr lang="en-US" dirty="0"/>
+              <a:t> { get; set; } = true;</a:t>
+            </a:r>
+          </a:p>
+          <a:p>
+            <a:r>
+              <a:rPr lang="en-US" dirty="0"/>
+              <a:t>Pass the new property as the second parameter to the </a:t>
+            </a:r>
+            <a:r>
+              <a:rPr lang="en-US" dirty="0" err="1"/>
+              <a:t>p_BookSearch</a:t>
+            </a:r>
+            <a:endParaRPr lang="en-US" dirty="0"/>
+          </a:p>
+        </p:txBody>
+      </p:sp>
+    </p:spTree>
+    <p:extLst>
+      <p:ext uri="{BB962C8B-B14F-4D97-AF65-F5344CB8AC3E}">
+        <p14:creationId xmlns:p14="http://schemas.microsoft.com/office/powerpoint/2010/main" val="741218323"/>
+      </p:ext>
+    </p:extLst>
+  </p:cSld>
+  <p:clrMapOvr>
+    <a:masterClrMapping/>
+  </p:clrMapOvr>
+  <p:timing>
+    <p:tnLst>
+      <p:par>
+        <p:cTn id="1" dur="indefinite" restart="never" nodeType="tmRoot">
+          <p:childTnLst>
+            <p:seq concurrent="1" nextAc="seek">
+              <p:cTn id="2" dur="indefinite" nodeType="mainSeq">
+                <p:childTnLst>
+                  <p:par>
+                    <p:cTn id="3" fill="hold">
+                      <p:stCondLst>
+                        <p:cond delay="indefinite"/>
+                      </p:stCondLst>
+                      <p:childTnLst>
+                        <p:par>
+                          <p:cTn id="4" fill="hold">
+                            <p:stCondLst>
+                              <p:cond delay="0"/>
+                            </p:stCondLst>
+                            <p:childTnLst>
+                              <p:par>
+                                <p:cTn id="5" presetID="1" presetClass="entr" presetSubtype="0" fill="hold" grpId="0" nodeType="clickEffect">
+                                  <p:stCondLst>
+                                    <p:cond delay="0"/>
+                                  </p:stCondLst>
+                                  <p:childTnLst>
+                                    <p:set>
+                                      <p:cBhvr>
+                                        <p:cTn id="6" dur="1" fill="hold">
+                                          <p:stCondLst>
+                                            <p:cond delay="0"/>
+                                          </p:stCondLst>
+                                        </p:cTn>
+                                        <p:tgtEl>
+                                          <p:spTgt spid="3">
+                                            <p:txEl>
+                                              <p:pRg st="0" end="0"/>
+                                            </p:txEl>
+                                          </p:spTgt>
+                                        </p:tgtEl>
+                                        <p:attrNameLst>
+                                          <p:attrName>style.visibility</p:attrName>
+                                        </p:attrNameLst>
+                                      </p:cBhvr>
+                                      <p:to>
+                                        <p:strVal val="visible"/>
+                                      </p:to>
+                                    </p:set>
+                                  </p:childTnLst>
+                                </p:cTn>
+                              </p:par>
+                              <p:par>
+                                <p:cTn id="7" presetID="1" presetClass="entr" presetSubtype="0" fill="hold" grpId="0" nodeType="withEffect">
+                                  <p:stCondLst>
+                                    <p:cond delay="0"/>
+                                  </p:stCondLst>
+                                  <p:childTnLst>
+                                    <p:set>
+                                      <p:cBhvr>
+                                        <p:cTn id="8" dur="1" fill="hold">
+                                          <p:stCondLst>
+                                            <p:cond delay="0"/>
+                                          </p:stCondLst>
+                                        </p:cTn>
+                                        <p:tgtEl>
+                                          <p:spTgt spid="3">
+                                            <p:txEl>
+                                              <p:pRg st="1" end="1"/>
+                                            </p:txEl>
+                                          </p:spTgt>
+                                        </p:tgtEl>
+                                        <p:attrNameLst>
+                                          <p:attrName>style.visibility</p:attrName>
+                                        </p:attrNameLst>
+                                      </p:cBhvr>
+                                      <p:to>
+                                        <p:strVal val="visible"/>
+                                      </p:to>
+                                    </p:set>
+                                  </p:childTnLst>
+                                </p:cTn>
+                              </p:par>
+                            </p:childTnLst>
+                          </p:cTn>
+                        </p:par>
+                      </p:childTnLst>
+                    </p:cTn>
+                  </p:par>
+                  <p:par>
+                    <p:cTn id="9" fill="hold">
+                      <p:stCondLst>
+                        <p:cond delay="indefinite"/>
+                      </p:stCondLst>
+                      <p:childTnLst>
+                        <p:par>
+                          <p:cTn id="10" fill="hold">
+                            <p:stCondLst>
+                              <p:cond delay="0"/>
+                            </p:stCondLst>
+                            <p:childTnLst>
+                              <p:par>
+                                <p:cTn id="11" presetID="1" presetClass="entr" presetSubtype="0" fill="hold" grpId="0" nodeType="clickEffect">
+                                  <p:stCondLst>
+                                    <p:cond delay="0"/>
+                                  </p:stCondLst>
+                                  <p:childTnLst>
+                                    <p:set>
+                                      <p:cBhvr>
+                                        <p:cTn id="12" dur="1" fill="hold">
+                                          <p:stCondLst>
+                                            <p:cond delay="0"/>
+                                          </p:stCondLst>
+                                        </p:cTn>
+                                        <p:tgtEl>
+                                          <p:spTgt spid="3">
+                                            <p:txEl>
+                                              <p:pRg st="2" end="2"/>
+                                            </p:txEl>
+                                          </p:spTgt>
+                                        </p:tgtEl>
+                                        <p:attrNameLst>
+                                          <p:attrName>style.visibility</p:attrName>
+                                        </p:attrNameLst>
+                                      </p:cBhvr>
+                                      <p:to>
+                                        <p:strVal val="visible"/>
+                                      </p:to>
+                                    </p:set>
+                                  </p:childTnLst>
+                                </p:cTn>
+                              </p:par>
+                            </p:childTnLst>
+                          </p:cTn>
+                        </p:par>
+                      </p:childTnLst>
+                    </p:cTn>
+                  </p:par>
+                </p:childTnLst>
+              </p:cTn>
+              <p:prevCondLst>
+                <p:cond evt="onPrev" delay="0">
+                  <p:tgtEl>
+                    <p:sldTgt/>
+                  </p:tgtEl>
+                </p:cond>
+              </p:prevCondLst>
+              <p:nextCondLst>
+                <p:cond evt="onNext" delay="0">
+                  <p:tgtEl>
+                    <p:sldTgt/>
+                  </p:tgtEl>
+                </p:cond>
+              </p:nextCondLst>
+            </p:seq>
+          </p:childTnLst>
+        </p:cTn>
+      </p:par>
+    </p:tnLst>
+    <p:bldLst>
+      <p:bldP spid="3" grpId="0" build="p"/>
+    </p:bldLst>
+  </p:timing>
+</p:sld>
+</file>
+
+<file path=ppt/slides/slide21.xml><?xml version="1.0" encoding="utf-8"?>
+<p:sld xmlns:a="http://schemas.openxmlformats.org/drawingml/2006/main" xmlns:r="http://schemas.openxmlformats.org/officeDocument/2006/relationships" xmlns:p="http://schemas.openxmlformats.org/presentationml/2006/main">
+  <p:cSld>
+    <p:spTree>
+      <p:nvGrpSpPr>
+        <p:cNvPr id="1" name=""/>
+        <p:cNvGrpSpPr/>
+        <p:nvPr/>
+      </p:nvGrpSpPr>
+      <p:grpSpPr>
+        <a:xfrm>
+          <a:off x="0" y="0"/>
+          <a:ext cx="0" cy="0"/>
+          <a:chOff x="0" y="0"/>
+          <a:chExt cx="0" cy="0"/>
+        </a:xfrm>
+      </p:grpSpPr>
+      <p:sp>
+        <p:nvSpPr>
+          <p:cNvPr id="2" name="Title 1">
+            <a:extLst>
+              <a:ext uri="{FF2B5EF4-FFF2-40B4-BE49-F238E27FC236}">
                 <a16:creationId xmlns:a16="http://schemas.microsoft.com/office/drawing/2014/main" id="{2408359A-BF71-4D54-8F29-2999CD569AF0}"/>
               </a:ext>
             </a:extLst>
@@ -5792,7 +6230,7 @@
 </p:sld>
 </file>
 
-<file path=ppt/slides/slide21.xml><?xml version="1.0" encoding="utf-8"?>
+<file path=ppt/slides/slide22.xml><?xml version="1.0" encoding="utf-8"?>
 <p:sld xmlns:a="http://schemas.openxmlformats.org/drawingml/2006/main" xmlns:r="http://schemas.openxmlformats.org/officeDocument/2006/relationships" xmlns:p="http://schemas.openxmlformats.org/presentationml/2006/main">
   <p:cSld>
     <p:spTree>
@@ -5880,7 +6318,7 @@
 </p:sld>
 </file>
 
-<file path=ppt/slides/slide22.xml><?xml version="1.0" encoding="utf-8"?>
+<file path=ppt/slides/slide23.xml><?xml version="1.0" encoding="utf-8"?>
 <p:sld xmlns:a="http://schemas.openxmlformats.org/drawingml/2006/main" xmlns:r="http://schemas.openxmlformats.org/officeDocument/2006/relationships" xmlns:p="http://schemas.openxmlformats.org/presentationml/2006/main">
   <p:cSld>
     <p:spTree>
@@ -5992,7 +6430,7 @@
 </p:sld>
 </file>
 
-<file path=ppt/slides/slide23.xml><?xml version="1.0" encoding="utf-8"?>
+<file path=ppt/slides/slide24.xml><?xml version="1.0" encoding="utf-8"?>
 <p:sld xmlns:a="http://schemas.openxmlformats.org/drawingml/2006/main" xmlns:r="http://schemas.openxmlformats.org/officeDocument/2006/relationships" xmlns:p="http://schemas.openxmlformats.org/presentationml/2006/main">
   <p:cSld>
     <p:spTree>
@@ -6413,137 +6851,6 @@
 </p:sld>
 </file>
 
-<file path=ppt/slides/slide24.xml><?xml version="1.0" encoding="utf-8"?>
-<p:sld xmlns:a="http://schemas.openxmlformats.org/drawingml/2006/main" xmlns:r="http://schemas.openxmlformats.org/officeDocument/2006/relationships" xmlns:p="http://schemas.openxmlformats.org/presentationml/2006/main">
-  <p:cSld>
-    <p:spTree>
-      <p:nvGrpSpPr>
-        <p:cNvPr id="1" name=""/>
-        <p:cNvGrpSpPr/>
-        <p:nvPr/>
-      </p:nvGrpSpPr>
-      <p:grpSpPr>
-        <a:xfrm>
-          <a:off x="0" y="0"/>
-          <a:ext cx="0" cy="0"/>
-          <a:chOff x="0" y="0"/>
-          <a:chExt cx="0" cy="0"/>
-        </a:xfrm>
-      </p:grpSpPr>
-      <p:sp>
-        <p:nvSpPr>
-          <p:cNvPr id="2" name="Title 1">
-            <a:extLst>
-              <a:ext uri="{FF2B5EF4-FFF2-40B4-BE49-F238E27FC236}">
-                <a16:creationId xmlns:a16="http://schemas.microsoft.com/office/drawing/2014/main" id="{939E01EE-A697-48C5-9CD4-375FF9B00282}"/>
-              </a:ext>
-            </a:extLst>
-          </p:cNvPr>
-          <p:cNvSpPr>
-            <a:spLocks noGrp="1"/>
-          </p:cNvSpPr>
-          <p:nvPr>
-            <p:ph type="title"/>
-          </p:nvPr>
-        </p:nvSpPr>
-        <p:spPr/>
-        <p:txBody>
-          <a:bodyPr/>
-          <a:lstStyle/>
-          <a:p>
-            <a:r>
-              <a:rPr lang="en-US" dirty="0"/>
-              <a:t>Technology and Tools</a:t>
-            </a:r>
-          </a:p>
-        </p:txBody>
-      </p:sp>
-      <p:sp>
-        <p:nvSpPr>
-          <p:cNvPr id="3" name="Content Placeholder 2">
-            <a:extLst>
-              <a:ext uri="{FF2B5EF4-FFF2-40B4-BE49-F238E27FC236}">
-                <a16:creationId xmlns:a16="http://schemas.microsoft.com/office/drawing/2014/main" id="{D644EBAC-9DEA-40D4-8351-646203948C76}"/>
-              </a:ext>
-            </a:extLst>
-          </p:cNvPr>
-          <p:cNvSpPr>
-            <a:spLocks noGrp="1"/>
-          </p:cNvSpPr>
-          <p:nvPr>
-            <p:ph idx="1"/>
-          </p:nvPr>
-        </p:nvSpPr>
-        <p:spPr/>
-        <p:txBody>
-          <a:bodyPr/>
-          <a:lstStyle/>
-          <a:p>
-            <a:r>
-              <a:rPr lang="en-US" dirty="0">
-                <a:hlinkClick r:id="rId2"/>
-              </a:rPr>
-              <a:t>Microsoft Visual Studio 2017</a:t>
-            </a:r>
-            <a:endParaRPr lang="en-US" dirty="0"/>
-          </a:p>
-          <a:p>
-            <a:r>
-              <a:rPr lang="en-US" dirty="0">
-                <a:hlinkClick r:id="rId3"/>
-              </a:rPr>
-              <a:t>Microsoft ASP.NET MVC 5</a:t>
-            </a:r>
-            <a:endParaRPr lang="en-US" dirty="0"/>
-          </a:p>
-          <a:p>
-            <a:r>
-              <a:rPr lang="en-US" dirty="0">
-                <a:hlinkClick r:id="rId4"/>
-              </a:rPr>
-              <a:t>Microsoft SQL Server Data Tools 2017</a:t>
-            </a:r>
-            <a:endParaRPr lang="en-US" dirty="0"/>
-          </a:p>
-          <a:p>
-            <a:r>
-              <a:rPr lang="en-US" dirty="0">
-                <a:hlinkClick r:id="rId5"/>
-              </a:rPr>
-              <a:t>Microsoft SQL Server Express </a:t>
-            </a:r>
-            <a:r>
-              <a:rPr lang="en-US" dirty="0" err="1">
-                <a:hlinkClick r:id="rId5"/>
-              </a:rPr>
-              <a:t>LocalDB</a:t>
-            </a:r>
-            <a:endParaRPr lang="en-US" dirty="0"/>
-          </a:p>
-          <a:p>
-            <a:r>
-              <a:rPr lang="en-US" dirty="0">
-                <a:hlinkClick r:id="rId6"/>
-              </a:rPr>
-              <a:t>Microsoft Entity Framework 6</a:t>
-            </a:r>
-            <a:endParaRPr lang="en-US" dirty="0"/>
-          </a:p>
-        </p:txBody>
-      </p:sp>
-    </p:spTree>
-    <p:extLst>
-      <p:ext uri="{BB962C8B-B14F-4D97-AF65-F5344CB8AC3E}">
-        <p14:creationId xmlns:p14="http://schemas.microsoft.com/office/powerpoint/2010/main" val="733713686"/>
-      </p:ext>
-    </p:extLst>
-  </p:cSld>
-  <p:clrMapOvr>
-    <a:masterClrMapping/>
-  </p:clrMapOvr>
-</p:sld>
-</file>
-
 <file path=ppt/slides/slide25.xml><?xml version="1.0" encoding="utf-8"?>
 <p:sld xmlns:a="http://schemas.openxmlformats.org/drawingml/2006/main" xmlns:r="http://schemas.openxmlformats.org/officeDocument/2006/relationships" xmlns:p="http://schemas.openxmlformats.org/presentationml/2006/main">
   <p:cSld>
@@ -6566,6 +6873,137 @@
           <p:cNvPr id="2" name="Title 1">
             <a:extLst>
               <a:ext uri="{FF2B5EF4-FFF2-40B4-BE49-F238E27FC236}">
+                <a16:creationId xmlns:a16="http://schemas.microsoft.com/office/drawing/2014/main" id="{939E01EE-A697-48C5-9CD4-375FF9B00282}"/>
+              </a:ext>
+            </a:extLst>
+          </p:cNvPr>
+          <p:cNvSpPr>
+            <a:spLocks noGrp="1"/>
+          </p:cNvSpPr>
+          <p:nvPr>
+            <p:ph type="title"/>
+          </p:nvPr>
+        </p:nvSpPr>
+        <p:spPr/>
+        <p:txBody>
+          <a:bodyPr/>
+          <a:lstStyle/>
+          <a:p>
+            <a:r>
+              <a:rPr lang="en-US" dirty="0"/>
+              <a:t>Technology and Tools</a:t>
+            </a:r>
+          </a:p>
+        </p:txBody>
+      </p:sp>
+      <p:sp>
+        <p:nvSpPr>
+          <p:cNvPr id="3" name="Content Placeholder 2">
+            <a:extLst>
+              <a:ext uri="{FF2B5EF4-FFF2-40B4-BE49-F238E27FC236}">
+                <a16:creationId xmlns:a16="http://schemas.microsoft.com/office/drawing/2014/main" id="{D644EBAC-9DEA-40D4-8351-646203948C76}"/>
+              </a:ext>
+            </a:extLst>
+          </p:cNvPr>
+          <p:cNvSpPr>
+            <a:spLocks noGrp="1"/>
+          </p:cNvSpPr>
+          <p:nvPr>
+            <p:ph idx="1"/>
+          </p:nvPr>
+        </p:nvSpPr>
+        <p:spPr/>
+        <p:txBody>
+          <a:bodyPr/>
+          <a:lstStyle/>
+          <a:p>
+            <a:r>
+              <a:rPr lang="en-US" dirty="0">
+                <a:hlinkClick r:id="rId2"/>
+              </a:rPr>
+              <a:t>Microsoft Visual Studio 2017</a:t>
+            </a:r>
+            <a:endParaRPr lang="en-US" dirty="0"/>
+          </a:p>
+          <a:p>
+            <a:r>
+              <a:rPr lang="en-US" dirty="0">
+                <a:hlinkClick r:id="rId3"/>
+              </a:rPr>
+              <a:t>Microsoft ASP.NET MVC 5</a:t>
+            </a:r>
+            <a:endParaRPr lang="en-US" dirty="0"/>
+          </a:p>
+          <a:p>
+            <a:r>
+              <a:rPr lang="en-US" dirty="0">
+                <a:hlinkClick r:id="rId4"/>
+              </a:rPr>
+              <a:t>Microsoft SQL Server Data Tools 2017</a:t>
+            </a:r>
+            <a:endParaRPr lang="en-US" dirty="0"/>
+          </a:p>
+          <a:p>
+            <a:r>
+              <a:rPr lang="en-US" dirty="0">
+                <a:hlinkClick r:id="rId5"/>
+              </a:rPr>
+              <a:t>Microsoft SQL Server Express </a:t>
+            </a:r>
+            <a:r>
+              <a:rPr lang="en-US" dirty="0" err="1">
+                <a:hlinkClick r:id="rId5"/>
+              </a:rPr>
+              <a:t>LocalDB</a:t>
+            </a:r>
+            <a:endParaRPr lang="en-US" dirty="0"/>
+          </a:p>
+          <a:p>
+            <a:r>
+              <a:rPr lang="en-US" dirty="0">
+                <a:hlinkClick r:id="rId6"/>
+              </a:rPr>
+              <a:t>Microsoft Entity Framework 6</a:t>
+            </a:r>
+            <a:endParaRPr lang="en-US" dirty="0"/>
+          </a:p>
+        </p:txBody>
+      </p:sp>
+    </p:spTree>
+    <p:extLst>
+      <p:ext uri="{BB962C8B-B14F-4D97-AF65-F5344CB8AC3E}">
+        <p14:creationId xmlns:p14="http://schemas.microsoft.com/office/powerpoint/2010/main" val="733713686"/>
+      </p:ext>
+    </p:extLst>
+  </p:cSld>
+  <p:clrMapOvr>
+    <a:masterClrMapping/>
+  </p:clrMapOvr>
+</p:sld>
+</file>
+
+<file path=ppt/slides/slide26.xml><?xml version="1.0" encoding="utf-8"?>
+<p:sld xmlns:a="http://schemas.openxmlformats.org/drawingml/2006/main" xmlns:r="http://schemas.openxmlformats.org/officeDocument/2006/relationships" xmlns:p="http://schemas.openxmlformats.org/presentationml/2006/main">
+  <p:cSld>
+    <p:spTree>
+      <p:nvGrpSpPr>
+        <p:cNvPr id="1" name=""/>
+        <p:cNvGrpSpPr/>
+        <p:nvPr/>
+      </p:nvGrpSpPr>
+      <p:grpSpPr>
+        <a:xfrm>
+          <a:off x="0" y="0"/>
+          <a:ext cx="0" cy="0"/>
+          <a:chOff x="0" y="0"/>
+          <a:chExt cx="0" cy="0"/>
+        </a:xfrm>
+      </p:grpSpPr>
+      <p:sp>
+        <p:nvSpPr>
+          <p:cNvPr id="2" name="Title 1">
+            <a:extLst>
+              <a:ext uri="{FF2B5EF4-FFF2-40B4-BE49-F238E27FC236}">
                 <a16:creationId xmlns:a16="http://schemas.microsoft.com/office/drawing/2014/main" id="{0AF6FECF-EF3D-498A-9346-236855DCA4BB}"/>
               </a:ext>
             </a:extLst>
@@ -6663,7 +7101,7 @@
 </p:sld>
 </file>
 
-<file path=ppt/slides/slide26.xml><?xml version="1.0" encoding="utf-8"?>
+<file path=ppt/slides/slide27.xml><?xml version="1.0" encoding="utf-8"?>
 <p:sld xmlns:a="http://schemas.openxmlformats.org/drawingml/2006/main" xmlns:r="http://schemas.openxmlformats.org/officeDocument/2006/relationships" xmlns:p="http://schemas.openxmlformats.org/presentationml/2006/main">
   <p:cSld>
     <p:spTree>
@@ -7176,6 +7614,158 @@
           <p:cNvPr id="2" name="Title 1">
             <a:extLst>
               <a:ext uri="{FF2B5EF4-FFF2-40B4-BE49-F238E27FC236}">
+                <a16:creationId xmlns:a16="http://schemas.microsoft.com/office/drawing/2014/main" id="{9B42E699-2472-4240-8C10-552970CC01E3}"/>
+              </a:ext>
+            </a:extLst>
+          </p:cNvPr>
+          <p:cNvSpPr>
+            <a:spLocks noGrp="1"/>
+          </p:cNvSpPr>
+          <p:nvPr>
+            <p:ph type="title"/>
+          </p:nvPr>
+        </p:nvSpPr>
+        <p:spPr/>
+        <p:txBody>
+          <a:bodyPr/>
+          <a:lstStyle/>
+          <a:p>
+            <a:r>
+              <a:rPr lang="en-US" dirty="0">
+                <a:hlinkClick r:id="rId2"/>
+              </a:rPr>
+              <a:t>Agile Development Process</a:t>
+            </a:r>
+            <a:endParaRPr lang="en-US" dirty="0"/>
+          </a:p>
+        </p:txBody>
+      </p:sp>
+      <p:sp>
+        <p:nvSpPr>
+          <p:cNvPr id="3" name="Content Placeholder 2">
+            <a:extLst>
+              <a:ext uri="{FF2B5EF4-FFF2-40B4-BE49-F238E27FC236}">
+                <a16:creationId xmlns:a16="http://schemas.microsoft.com/office/drawing/2014/main" id="{CB348BF2-2016-4878-92A6-FE61E6A686E4}"/>
+              </a:ext>
+            </a:extLst>
+          </p:cNvPr>
+          <p:cNvSpPr>
+            <a:spLocks noGrp="1"/>
+          </p:cNvSpPr>
+          <p:nvPr>
+            <p:ph idx="1"/>
+          </p:nvPr>
+        </p:nvSpPr>
+        <p:spPr/>
+        <p:txBody>
+          <a:bodyPr/>
+          <a:lstStyle/>
+          <a:p>
+            <a:r>
+              <a:rPr lang="en-US" dirty="0"/>
+              <a:t>Individuals and interactions over processes and tools</a:t>
+            </a:r>
+          </a:p>
+          <a:p>
+            <a:r>
+              <a:rPr lang="en-US" dirty="0"/>
+              <a:t>Working software over comprehensive documentation</a:t>
+            </a:r>
+          </a:p>
+          <a:p>
+            <a:r>
+              <a:rPr lang="en-US" dirty="0"/>
+              <a:t>Customer collaboration over contract negotiation</a:t>
+            </a:r>
+          </a:p>
+          <a:p>
+            <a:r>
+              <a:rPr lang="en-US" dirty="0"/>
+              <a:t>Responding to change over following a plan</a:t>
+            </a:r>
+          </a:p>
+        </p:txBody>
+      </p:sp>
+      <p:pic>
+        <p:nvPicPr>
+          <p:cNvPr id="1026" name="Picture 2" descr="Image result for agile process">
+            <a:extLst>
+              <a:ext uri="{FF2B5EF4-FFF2-40B4-BE49-F238E27FC236}">
+                <a16:creationId xmlns:a16="http://schemas.microsoft.com/office/drawing/2014/main" id="{BA020946-E983-416B-A6CD-904FC298622D}"/>
+              </a:ext>
+            </a:extLst>
+          </p:cNvPr>
+          <p:cNvPicPr>
+            <a:picLocks noChangeAspect="1" noChangeArrowheads="1"/>
+          </p:cNvPicPr>
+          <p:nvPr/>
+        </p:nvPicPr>
+        <p:blipFill rotWithShape="1">
+          <a:blip r:embed="rId3">
+            <a:extLst>
+              <a:ext uri="{28A0092B-C50C-407E-A947-70E740481C1C}">
+                <a14:useLocalDpi xmlns:a14="http://schemas.microsoft.com/office/drawing/2010/main" val="0"/>
+              </a:ext>
+            </a:extLst>
+          </a:blip>
+          <a:srcRect t="19927" b="20932"/>
+          <a:stretch/>
+        </p:blipFill>
+        <p:spPr bwMode="auto">
+          <a:xfrm>
+            <a:off x="2190750" y="4001294"/>
+            <a:ext cx="7810500" cy="2151889"/>
+          </a:xfrm>
+          <a:prstGeom prst="rect">
+            <a:avLst/>
+          </a:prstGeom>
+          <a:noFill/>
+          <a:extLst>
+            <a:ext uri="{909E8E84-426E-40DD-AFC4-6F175D3DCCD1}">
+              <a14:hiddenFill xmlns:a14="http://schemas.microsoft.com/office/drawing/2010/main">
+                <a:solidFill>
+                  <a:srgbClr val="FFFFFF"/>
+                </a:solidFill>
+              </a14:hiddenFill>
+            </a:ext>
+          </a:extLst>
+        </p:spPr>
+      </p:pic>
+    </p:spTree>
+    <p:extLst>
+      <p:ext uri="{BB962C8B-B14F-4D97-AF65-F5344CB8AC3E}">
+        <p14:creationId xmlns:p14="http://schemas.microsoft.com/office/powerpoint/2010/main" val="3808834016"/>
+      </p:ext>
+    </p:extLst>
+  </p:cSld>
+  <p:clrMapOvr>
+    <a:masterClrMapping/>
+  </p:clrMapOvr>
+</p:sld>
+</file>
+
+<file path=ppt/slides/slide5.xml><?xml version="1.0" encoding="utf-8"?>
+<p:sld xmlns:a="http://schemas.openxmlformats.org/drawingml/2006/main" xmlns:r="http://schemas.openxmlformats.org/officeDocument/2006/relationships" xmlns:p="http://schemas.openxmlformats.org/presentationml/2006/main">
+  <p:cSld>
+    <p:spTree>
+      <p:nvGrpSpPr>
+        <p:cNvPr id="1" name=""/>
+        <p:cNvGrpSpPr/>
+        <p:nvPr/>
+      </p:nvGrpSpPr>
+      <p:grpSpPr>
+        <a:xfrm>
+          <a:off x="0" y="0"/>
+          <a:ext cx="0" cy="0"/>
+          <a:chOff x="0" y="0"/>
+          <a:chExt cx="0" cy="0"/>
+        </a:xfrm>
+      </p:grpSpPr>
+      <p:sp>
+        <p:nvSpPr>
+          <p:cNvPr id="2" name="Title 1">
+            <a:extLst>
+              <a:ext uri="{FF2B5EF4-FFF2-40B4-BE49-F238E27FC236}">
                 <a16:creationId xmlns:a16="http://schemas.microsoft.com/office/drawing/2014/main" id="{342164C9-52C2-4B9A-B661-31BB2DCCB5FD}"/>
               </a:ext>
             </a:extLst>
@@ -7300,7 +7890,7 @@
 </p:sld>
 </file>
 
-<file path=ppt/slides/slide5.xml><?xml version="1.0" encoding="utf-8"?>
+<file path=ppt/slides/slide6.xml><?xml version="1.0" encoding="utf-8"?>
 <p:sld xmlns:a="http://schemas.openxmlformats.org/drawingml/2006/main" xmlns:r="http://schemas.openxmlformats.org/officeDocument/2006/relationships" xmlns:p="http://schemas.openxmlformats.org/presentationml/2006/main">
   <p:cSld>
     <p:spTree>
@@ -7707,7 +8297,7 @@
 </p:sld>
 </file>
 
-<file path=ppt/slides/slide6.xml><?xml version="1.0" encoding="utf-8"?>
+<file path=ppt/slides/slide7.xml><?xml version="1.0" encoding="utf-8"?>
 <p:sld xmlns:a="http://schemas.openxmlformats.org/drawingml/2006/main" xmlns:r="http://schemas.openxmlformats.org/officeDocument/2006/relationships" xmlns:p="http://schemas.openxmlformats.org/presentationml/2006/main">
   <p:cSld>
     <p:spTree>
@@ -7861,7 +8451,7 @@
 </p:sld>
 </file>
 
-<file path=ppt/slides/slide7.xml><?xml version="1.0" encoding="utf-8"?>
+<file path=ppt/slides/slide8.xml><?xml version="1.0" encoding="utf-8"?>
 <p:sld xmlns:a="http://schemas.openxmlformats.org/drawingml/2006/main" xmlns:r="http://schemas.openxmlformats.org/officeDocument/2006/relationships" xmlns:p="http://schemas.openxmlformats.org/presentationml/2006/main">
   <p:cSld>
     <p:spTree>
@@ -7949,124 +8539,6 @@
 </p:sld>
 </file>
 
-<file path=ppt/slides/slide8.xml><?xml version="1.0" encoding="utf-8"?>
-<p:sld xmlns:a="http://schemas.openxmlformats.org/drawingml/2006/main" xmlns:r="http://schemas.openxmlformats.org/officeDocument/2006/relationships" xmlns:p="http://schemas.openxmlformats.org/presentationml/2006/main">
-  <p:cSld>
-    <p:spTree>
-      <p:nvGrpSpPr>
-        <p:cNvPr id="1" name=""/>
-        <p:cNvGrpSpPr/>
-        <p:nvPr/>
-      </p:nvGrpSpPr>
-      <p:grpSpPr>
-        <a:xfrm>
-          <a:off x="0" y="0"/>
-          <a:ext cx="0" cy="0"/>
-          <a:chOff x="0" y="0"/>
-          <a:chExt cx="0" cy="0"/>
-        </a:xfrm>
-      </p:grpSpPr>
-      <p:sp>
-        <p:nvSpPr>
-          <p:cNvPr id="2" name="Title 1">
-            <a:extLst>
-              <a:ext uri="{FF2B5EF4-FFF2-40B4-BE49-F238E27FC236}">
-                <a16:creationId xmlns:a16="http://schemas.microsoft.com/office/drawing/2014/main" id="{2A508BF1-C4FC-40A6-90D4-3AC64EFC4119}"/>
-              </a:ext>
-            </a:extLst>
-          </p:cNvPr>
-          <p:cNvSpPr>
-            <a:spLocks noGrp="1"/>
-          </p:cNvSpPr>
-          <p:nvPr>
-            <p:ph type="title"/>
-          </p:nvPr>
-        </p:nvSpPr>
-        <p:spPr/>
-        <p:txBody>
-          <a:bodyPr/>
-          <a:lstStyle/>
-          <a:p>
-            <a:r>
-              <a:rPr lang="en-US" dirty="0"/>
-              <a:t>Client Email Alert!</a:t>
-            </a:r>
-          </a:p>
-        </p:txBody>
-      </p:sp>
-      <p:sp>
-        <p:nvSpPr>
-          <p:cNvPr id="3" name="Content Placeholder 2">
-            <a:extLst>
-              <a:ext uri="{FF2B5EF4-FFF2-40B4-BE49-F238E27FC236}">
-                <a16:creationId xmlns:a16="http://schemas.microsoft.com/office/drawing/2014/main" id="{F14718FF-5A9E-4ABB-B37A-FEE7EEEB2A96}"/>
-              </a:ext>
-            </a:extLst>
-          </p:cNvPr>
-          <p:cNvSpPr>
-            <a:spLocks noGrp="1"/>
-          </p:cNvSpPr>
-          <p:nvPr>
-            <p:ph idx="1"/>
-          </p:nvPr>
-        </p:nvSpPr>
-        <p:spPr>
-          <a:xfrm>
-            <a:off x="838200" y="1825625"/>
-            <a:ext cx="10515600" cy="4351338"/>
-          </a:xfrm>
-        </p:spPr>
-        <p:txBody>
-          <a:bodyPr/>
-          <a:lstStyle/>
-          <a:p>
-            <a:pPr marL="0" indent="0">
-              <a:buNone/>
-            </a:pPr>
-            <a:r>
-              <a:rPr lang="en-US" dirty="0"/>
-              <a:t>From: Tom</a:t>
-            </a:r>
-          </a:p>
-          <a:p>
-            <a:pPr marL="0" indent="0">
-              <a:buNone/>
-            </a:pPr>
-            <a:r>
-              <a:rPr lang="en-US" dirty="0"/>
-              <a:t>Subject: Book Search</a:t>
-            </a:r>
-          </a:p>
-          <a:p>
-            <a:pPr marL="0" indent="0">
-              <a:buNone/>
-            </a:pPr>
-            <a:endParaRPr lang="en-US" sz="2000" dirty="0"/>
-          </a:p>
-          <a:p>
-            <a:pPr marL="0" indent="0">
-              <a:buNone/>
-            </a:pPr>
-            <a:r>
-              <a:rPr lang="en-US" sz="2000" dirty="0"/>
-              <a:t>Every time I try to search by ISBN nothing shows up. I put in all the ISBN numbers for every book but this never seems to work! I just put in Electric Sheep (978-0-345-40447-3) and I can only find that copy by title or author and scrolling through the versions. This needs to get fixed ASAP!</a:t>
-            </a:r>
-          </a:p>
-        </p:txBody>
-      </p:sp>
-    </p:spTree>
-    <p:extLst>
-      <p:ext uri="{BB962C8B-B14F-4D97-AF65-F5344CB8AC3E}">
-        <p14:creationId xmlns:p14="http://schemas.microsoft.com/office/powerpoint/2010/main" val="2364432890"/>
-      </p:ext>
-    </p:extLst>
-  </p:cSld>
-  <p:clrMapOvr>
-    <a:masterClrMapping/>
-  </p:clrMapOvr>
-</p:sld>
-</file>
-
 <file path=ppt/slides/slide9.xml><?xml version="1.0" encoding="utf-8"?>
 <p:sld xmlns:a="http://schemas.openxmlformats.org/drawingml/2006/main" xmlns:r="http://schemas.openxmlformats.org/officeDocument/2006/relationships" xmlns:p="http://schemas.openxmlformats.org/presentationml/2006/main">
   <p:cSld>
@@ -8089,7 +8561,7 @@
           <p:cNvPr id="2" name="Title 1">
             <a:extLst>
               <a:ext uri="{FF2B5EF4-FFF2-40B4-BE49-F238E27FC236}">
-                <a16:creationId xmlns:a16="http://schemas.microsoft.com/office/drawing/2014/main" id="{6173EB60-CCB0-43F1-8AEE-1B825B728D3F}"/>
+                <a16:creationId xmlns:a16="http://schemas.microsoft.com/office/drawing/2014/main" id="{2A508BF1-C4FC-40A6-90D4-3AC64EFC4119}"/>
               </a:ext>
             </a:extLst>
           </p:cNvPr>
@@ -8107,7 +8579,7 @@
           <a:p>
             <a:r>
               <a:rPr lang="en-US" dirty="0"/>
-              <a:t>Book Search Needs to Search by ISBN</a:t>
+              <a:t>Client Email Alert!</a:t>
             </a:r>
           </a:p>
         </p:txBody>
@@ -8117,7 +8589,7 @@
           <p:cNvPr id="3" name="Content Placeholder 2">
             <a:extLst>
               <a:ext uri="{FF2B5EF4-FFF2-40B4-BE49-F238E27FC236}">
-                <a16:creationId xmlns:a16="http://schemas.microsoft.com/office/drawing/2014/main" id="{02649CE7-4E10-4A72-A51D-5317CB9ED571}"/>
+                <a16:creationId xmlns:a16="http://schemas.microsoft.com/office/drawing/2014/main" id="{F14718FF-5A9E-4ABB-B37A-FEE7EEEB2A96}"/>
               </a:ext>
             </a:extLst>
           </p:cNvPr>
@@ -8128,91 +8600,46 @@
             <p:ph idx="1"/>
           </p:nvPr>
         </p:nvSpPr>
-        <p:spPr/>
-        <p:txBody>
-          <a:bodyPr/>
-          <a:lstStyle/>
-          <a:p>
-            <a:r>
-              <a:rPr lang="en-US" dirty="0"/>
-              <a:t>Edit the </a:t>
-            </a:r>
-            <a:r>
-              <a:rPr lang="en-US" dirty="0" err="1"/>
-              <a:t>Bookzilla</a:t>
-            </a:r>
-            <a:r>
-              <a:rPr lang="en-US" dirty="0"/>
-              <a:t>\</a:t>
-            </a:r>
-            <a:r>
-              <a:rPr lang="en-US" dirty="0" err="1"/>
-              <a:t>dbo</a:t>
-            </a:r>
-            <a:r>
-              <a:rPr lang="en-US" dirty="0"/>
-              <a:t>\Stored Procedures\</a:t>
-            </a:r>
-            <a:r>
-              <a:rPr lang="en-US" dirty="0" err="1"/>
-              <a:t>p_BookSearch.sql</a:t>
-            </a:r>
-            <a:r>
-              <a:rPr lang="en-US" dirty="0"/>
-              <a:t> file to search on ISBN</a:t>
-            </a:r>
-          </a:p>
-          <a:p>
-            <a:r>
-              <a:rPr lang="en-US" dirty="0"/>
-              <a:t>Schema Compare the change to the database</a:t>
-            </a:r>
-          </a:p>
-          <a:p>
-            <a:pPr lvl="1"/>
-            <a:r>
-              <a:rPr lang="en-US" dirty="0" err="1"/>
-              <a:t>Bookzilla</a:t>
-            </a:r>
-            <a:r>
-              <a:rPr lang="en-US" dirty="0"/>
-              <a:t> &gt; Right-click &gt; Schema Compare</a:t>
-            </a:r>
-          </a:p>
-          <a:p>
-            <a:pPr lvl="1"/>
-            <a:r>
-              <a:rPr lang="en-US" dirty="0"/>
-              <a:t>Source: </a:t>
-            </a:r>
-            <a:r>
-              <a:rPr lang="en-US" dirty="0" err="1"/>
-              <a:t>Bookzilla</a:t>
-            </a:r>
-            <a:r>
-              <a:rPr lang="en-US" dirty="0"/>
-              <a:t> Project</a:t>
-            </a:r>
-          </a:p>
-          <a:p>
-            <a:pPr lvl="1"/>
-            <a:r>
-              <a:rPr lang="en-US" dirty="0"/>
-              <a:t>Target: </a:t>
-            </a:r>
-            <a:r>
-              <a:rPr lang="en-US" dirty="0" err="1"/>
-              <a:t>Bookzilla</a:t>
-            </a:r>
-            <a:r>
-              <a:rPr lang="en-US" dirty="0"/>
-              <a:t> Database</a:t>
-            </a:r>
-          </a:p>
-          <a:p>
-            <a:r>
-              <a:rPr lang="en-US" dirty="0"/>
-              <a:t>Test</a:t>
+        <p:spPr>
+          <a:xfrm>
+            <a:off x="838200" y="1825625"/>
+            <a:ext cx="10515600" cy="4351338"/>
+          </a:xfrm>
+        </p:spPr>
+        <p:txBody>
+          <a:bodyPr/>
+          <a:lstStyle/>
+          <a:p>
+            <a:pPr marL="0" indent="0">
+              <a:buNone/>
+            </a:pPr>
+            <a:r>
+              <a:rPr lang="en-US" dirty="0"/>
+              <a:t>From: Tom</a:t>
+            </a:r>
+          </a:p>
+          <a:p>
+            <a:pPr marL="0" indent="0">
+              <a:buNone/>
+            </a:pPr>
+            <a:r>
+              <a:rPr lang="en-US" dirty="0"/>
+              <a:t>Subject: Book Search</a:t>
+            </a:r>
+          </a:p>
+          <a:p>
+            <a:pPr marL="0" indent="0">
+              <a:buNone/>
+            </a:pPr>
+            <a:endParaRPr lang="en-US" sz="2000" dirty="0"/>
+          </a:p>
+          <a:p>
+            <a:pPr marL="0" indent="0">
+              <a:buNone/>
+            </a:pPr>
+            <a:r>
+              <a:rPr lang="en-US" sz="2000" dirty="0"/>
+              <a:t>Every time I try to search by ISBN nothing shows up. I put in all the ISBN numbers for every book but this never seems to work! I just put in Electric Sheep (978-0-345-40447-3) and I can only find that copy by title or author and scrolling through the versions. This needs to get fixed ASAP!</a:t>
             </a:r>
           </a:p>
         </p:txBody>
@@ -8220,286 +8647,13 @@
     </p:spTree>
     <p:extLst>
       <p:ext uri="{BB962C8B-B14F-4D97-AF65-F5344CB8AC3E}">
-        <p14:creationId xmlns:p14="http://schemas.microsoft.com/office/powerpoint/2010/main" val="2424050540"/>
+        <p14:creationId xmlns:p14="http://schemas.microsoft.com/office/powerpoint/2010/main" val="2364432890"/>
       </p:ext>
     </p:extLst>
   </p:cSld>
   <p:clrMapOvr>
     <a:masterClrMapping/>
   </p:clrMapOvr>
-  <p:timing>
-    <p:tnLst>
-      <p:par>
-        <p:cTn id="1" dur="indefinite" restart="never" nodeType="tmRoot">
-          <p:childTnLst>
-            <p:seq concurrent="1" nextAc="seek">
-              <p:cTn id="2" dur="indefinite" nodeType="mainSeq">
-                <p:childTnLst>
-                  <p:par>
-                    <p:cTn id="3" fill="hold">
-                      <p:stCondLst>
-                        <p:cond delay="indefinite"/>
-                      </p:stCondLst>
-                      <p:childTnLst>
-                        <p:par>
-                          <p:cTn id="4" fill="hold">
-                            <p:stCondLst>
-                              <p:cond delay="0"/>
-                            </p:stCondLst>
-                            <p:childTnLst>
-                              <p:par>
-                                <p:cTn id="5" presetID="1" presetClass="entr" presetSubtype="0" fill="hold" grpId="0" nodeType="clickEffect">
-                                  <p:stCondLst>
-                                    <p:cond delay="0"/>
-                                  </p:stCondLst>
-                                  <p:childTnLst>
-                                    <p:set>
-                                      <p:cBhvr>
-                                        <p:cTn id="6" dur="1" fill="hold">
-                                          <p:stCondLst>
-                                            <p:cond delay="0"/>
-                                          </p:stCondLst>
-                                        </p:cTn>
-                                        <p:tgtEl>
-                                          <p:spTgt spid="3">
-                                            <p:txEl>
-                                              <p:pRg st="0" end="0"/>
-                                            </p:txEl>
-                                          </p:spTgt>
-                                        </p:tgtEl>
-                                        <p:attrNameLst>
-                                          <p:attrName>style.visibility</p:attrName>
-                                        </p:attrNameLst>
-                                      </p:cBhvr>
-                                      <p:to>
-                                        <p:strVal val="visible"/>
-                                      </p:to>
-                                    </p:set>
-                                  </p:childTnLst>
-                                </p:cTn>
-                              </p:par>
-                            </p:childTnLst>
-                          </p:cTn>
-                        </p:par>
-                      </p:childTnLst>
-                    </p:cTn>
-                  </p:par>
-                  <p:par>
-                    <p:cTn id="7" fill="hold">
-                      <p:stCondLst>
-                        <p:cond delay="indefinite"/>
-                      </p:stCondLst>
-                      <p:childTnLst>
-                        <p:par>
-                          <p:cTn id="8" fill="hold">
-                            <p:stCondLst>
-                              <p:cond delay="0"/>
-                            </p:stCondLst>
-                            <p:childTnLst>
-                              <p:par>
-                                <p:cTn id="9" presetID="1" presetClass="entr" presetSubtype="0" fill="hold" grpId="0" nodeType="clickEffect">
-                                  <p:stCondLst>
-                                    <p:cond delay="0"/>
-                                  </p:stCondLst>
-                                  <p:childTnLst>
-                                    <p:set>
-                                      <p:cBhvr>
-                                        <p:cTn id="10" dur="1" fill="hold">
-                                          <p:stCondLst>
-                                            <p:cond delay="0"/>
-                                          </p:stCondLst>
-                                        </p:cTn>
-                                        <p:tgtEl>
-                                          <p:spTgt spid="3">
-                                            <p:txEl>
-                                              <p:pRg st="1" end="1"/>
-                                            </p:txEl>
-                                          </p:spTgt>
-                                        </p:tgtEl>
-                                        <p:attrNameLst>
-                                          <p:attrName>style.visibility</p:attrName>
-                                        </p:attrNameLst>
-                                      </p:cBhvr>
-                                      <p:to>
-                                        <p:strVal val="visible"/>
-                                      </p:to>
-                                    </p:set>
-                                  </p:childTnLst>
-                                </p:cTn>
-                              </p:par>
-                              <p:par>
-                                <p:cTn id="11" presetID="1" presetClass="entr" presetSubtype="0" fill="hold" grpId="0" nodeType="withEffect">
-                                  <p:stCondLst>
-                                    <p:cond delay="0"/>
-                                  </p:stCondLst>
-                                  <p:childTnLst>
-                                    <p:set>
-                                      <p:cBhvr>
-                                        <p:cTn id="12" dur="1" fill="hold">
-                                          <p:stCondLst>
-                                            <p:cond delay="0"/>
-                                          </p:stCondLst>
-                                        </p:cTn>
-                                        <p:tgtEl>
-                                          <p:spTgt spid="3">
-                                            <p:txEl>
-                                              <p:pRg st="2" end="2"/>
-                                            </p:txEl>
-                                          </p:spTgt>
-                                        </p:tgtEl>
-                                        <p:attrNameLst>
-                                          <p:attrName>style.visibility</p:attrName>
-                                        </p:attrNameLst>
-                                      </p:cBhvr>
-                                      <p:to>
-                                        <p:strVal val="visible"/>
-                                      </p:to>
-                                    </p:set>
-                                  </p:childTnLst>
-                                </p:cTn>
-                              </p:par>
-                              <p:par>
-                                <p:cTn id="13" presetID="1" presetClass="entr" presetSubtype="0" fill="hold" grpId="0" nodeType="withEffect">
-                                  <p:stCondLst>
-                                    <p:cond delay="0"/>
-                                  </p:stCondLst>
-                                  <p:childTnLst>
-                                    <p:set>
-                                      <p:cBhvr>
-                                        <p:cTn id="14" dur="1" fill="hold">
-                                          <p:stCondLst>
-                                            <p:cond delay="0"/>
-                                          </p:stCondLst>
-                                        </p:cTn>
-                                        <p:tgtEl>
-                                          <p:spTgt spid="3">
-                                            <p:txEl>
-                                              <p:pRg st="3" end="3"/>
-                                            </p:txEl>
-                                          </p:spTgt>
-                                        </p:tgtEl>
-                                        <p:attrNameLst>
-                                          <p:attrName>style.visibility</p:attrName>
-                                        </p:attrNameLst>
-                                      </p:cBhvr>
-                                      <p:to>
-                                        <p:strVal val="visible"/>
-                                      </p:to>
-                                    </p:set>
-                                  </p:childTnLst>
-                                </p:cTn>
-                              </p:par>
-                              <p:par>
-                                <p:cTn id="15" presetID="1" presetClass="entr" presetSubtype="0" fill="hold" grpId="0" nodeType="withEffect">
-                                  <p:stCondLst>
-                                    <p:cond delay="0"/>
-                                  </p:stCondLst>
-                                  <p:childTnLst>
-                                    <p:set>
-                                      <p:cBhvr>
-                                        <p:cTn id="16" dur="1" fill="hold">
-                                          <p:stCondLst>
-                                            <p:cond delay="0"/>
-                                          </p:stCondLst>
-                                        </p:cTn>
-                                        <p:tgtEl>
-                                          <p:spTgt spid="3">
-                                            <p:txEl>
-                                              <p:pRg st="4" end="4"/>
-                                            </p:txEl>
-                                          </p:spTgt>
-                                        </p:tgtEl>
-                                        <p:attrNameLst>
-                                          <p:attrName>style.visibility</p:attrName>
-                                        </p:attrNameLst>
-                                      </p:cBhvr>
-                                      <p:to>
-                                        <p:strVal val="visible"/>
-                                      </p:to>
-                                    </p:set>
-                                  </p:childTnLst>
-                                </p:cTn>
-                              </p:par>
-                            </p:childTnLst>
-                          </p:cTn>
-                        </p:par>
-                      </p:childTnLst>
-                    </p:cTn>
-                  </p:par>
-                  <p:par>
-                    <p:cTn id="17" fill="hold">
-                      <p:stCondLst>
-                        <p:cond delay="indefinite"/>
-                      </p:stCondLst>
-                      <p:childTnLst>
-                        <p:par>
-                          <p:cTn id="18" fill="hold">
-                            <p:stCondLst>
-                              <p:cond delay="0"/>
-                            </p:stCondLst>
-                            <p:childTnLst>
-                              <p:par>
-                                <p:cTn id="19" presetID="1" presetClass="entr" presetSubtype="0" fill="hold" grpId="0" nodeType="clickEffect">
-                                  <p:stCondLst>
-                                    <p:cond delay="0"/>
-                                  </p:stCondLst>
-                                  <p:childTnLst>
-                                    <p:set>
-                                      <p:cBhvr>
-                                        <p:cTn id="20" dur="1" fill="hold">
-                                          <p:stCondLst>
-                                            <p:cond delay="0"/>
-                                          </p:stCondLst>
-                                        </p:cTn>
-                                        <p:tgtEl>
-                                          <p:spTgt spid="3">
-                                            <p:txEl>
-                                              <p:pRg st="5" end="5"/>
-                                            </p:txEl>
-                                          </p:spTgt>
-                                        </p:tgtEl>
-                                        <p:attrNameLst>
-                                          <p:attrName>style.visibility</p:attrName>
-                                        </p:attrNameLst>
-                                      </p:cBhvr>
-                                      <p:to>
-                                        <p:strVal val="visible"/>
-                                      </p:to>
-                                    </p:set>
-                                  </p:childTnLst>
-                                </p:cTn>
-                              </p:par>
-                            </p:childTnLst>
-                          </p:cTn>
-                        </p:par>
-                      </p:childTnLst>
-                    </p:cTn>
-                  </p:par>
-                </p:childTnLst>
-              </p:cTn>
-              <p:prevCondLst>
-                <p:cond evt="onPrev" delay="0">
-                  <p:tgtEl>
-                    <p:sldTgt/>
-                  </p:tgtEl>
-                </p:cond>
-              </p:prevCondLst>
-              <p:nextCondLst>
-                <p:cond evt="onNext" delay="0">
-                  <p:tgtEl>
-                    <p:sldTgt/>
-                  </p:tgtEl>
-                </p:cond>
-              </p:nextCondLst>
-            </p:seq>
-          </p:childTnLst>
-        </p:cTn>
-      </p:par>
-    </p:tnLst>
-    <p:bldLst>
-      <p:bldP spid="3" grpId="0" build="p"/>
-    </p:bldLst>
-  </p:timing>
 </p:sld>
 </file>
 

</xml_diff>

<commit_message>
updates for animations on design slide.
</commit_message>
<xml_diff>
--- a/UWG - Code and Load - 20181127.pptx
+++ b/UWG - Code and Load - 20181127.pptx
@@ -7072,10 +7072,7 @@
               </a:rPr>
               <a:t>Data Context Interaction (DCI)</a:t>
             </a:r>
-            <a:r>
-              <a:rPr lang="en-US" dirty="0"/>
-              <a:t> – Entity Framework</a:t>
-            </a:r>
+            <a:endParaRPr lang="en-US" dirty="0"/>
           </a:p>
           <a:p>
             <a:r>
@@ -7098,6 +7095,235 @@
   <p:clrMapOvr>
     <a:masterClrMapping/>
   </p:clrMapOvr>
+  <p:timing>
+    <p:tnLst>
+      <p:par>
+        <p:cTn id="1" dur="indefinite" restart="never" nodeType="tmRoot">
+          <p:childTnLst>
+            <p:seq concurrent="1" nextAc="seek">
+              <p:cTn id="2" dur="indefinite" nodeType="mainSeq">
+                <p:childTnLst>
+                  <p:par>
+                    <p:cTn id="3" fill="hold">
+                      <p:stCondLst>
+                        <p:cond delay="indefinite"/>
+                      </p:stCondLst>
+                      <p:childTnLst>
+                        <p:par>
+                          <p:cTn id="4" fill="hold">
+                            <p:stCondLst>
+                              <p:cond delay="0"/>
+                            </p:stCondLst>
+                            <p:childTnLst>
+                              <p:par>
+                                <p:cTn id="5" presetID="1" presetClass="entr" presetSubtype="0" fill="hold" grpId="0" nodeType="clickEffect">
+                                  <p:stCondLst>
+                                    <p:cond delay="0"/>
+                                  </p:stCondLst>
+                                  <p:childTnLst>
+                                    <p:set>
+                                      <p:cBhvr>
+                                        <p:cTn id="6" dur="1" fill="hold">
+                                          <p:stCondLst>
+                                            <p:cond delay="0"/>
+                                          </p:stCondLst>
+                                        </p:cTn>
+                                        <p:tgtEl>
+                                          <p:spTgt spid="3">
+                                            <p:txEl>
+                                              <p:pRg st="0" end="0"/>
+                                            </p:txEl>
+                                          </p:spTgt>
+                                        </p:tgtEl>
+                                        <p:attrNameLst>
+                                          <p:attrName>style.visibility</p:attrName>
+                                        </p:attrNameLst>
+                                      </p:cBhvr>
+                                      <p:to>
+                                        <p:strVal val="visible"/>
+                                      </p:to>
+                                    </p:set>
+                                  </p:childTnLst>
+                                </p:cTn>
+                              </p:par>
+                            </p:childTnLst>
+                          </p:cTn>
+                        </p:par>
+                      </p:childTnLst>
+                    </p:cTn>
+                  </p:par>
+                  <p:par>
+                    <p:cTn id="7" fill="hold">
+                      <p:stCondLst>
+                        <p:cond delay="indefinite"/>
+                      </p:stCondLst>
+                      <p:childTnLst>
+                        <p:par>
+                          <p:cTn id="8" fill="hold">
+                            <p:stCondLst>
+                              <p:cond delay="0"/>
+                            </p:stCondLst>
+                            <p:childTnLst>
+                              <p:par>
+                                <p:cTn id="9" presetID="1" presetClass="entr" presetSubtype="0" fill="hold" grpId="0" nodeType="clickEffect">
+                                  <p:stCondLst>
+                                    <p:cond delay="0"/>
+                                  </p:stCondLst>
+                                  <p:childTnLst>
+                                    <p:set>
+                                      <p:cBhvr>
+                                        <p:cTn id="10" dur="1" fill="hold">
+                                          <p:stCondLst>
+                                            <p:cond delay="0"/>
+                                          </p:stCondLst>
+                                        </p:cTn>
+                                        <p:tgtEl>
+                                          <p:spTgt spid="3">
+                                            <p:txEl>
+                                              <p:pRg st="1" end="1"/>
+                                            </p:txEl>
+                                          </p:spTgt>
+                                        </p:tgtEl>
+                                        <p:attrNameLst>
+                                          <p:attrName>style.visibility</p:attrName>
+                                        </p:attrNameLst>
+                                      </p:cBhvr>
+                                      <p:to>
+                                        <p:strVal val="visible"/>
+                                      </p:to>
+                                    </p:set>
+                                  </p:childTnLst>
+                                </p:cTn>
+                              </p:par>
+                            </p:childTnLst>
+                          </p:cTn>
+                        </p:par>
+                      </p:childTnLst>
+                    </p:cTn>
+                  </p:par>
+                  <p:par>
+                    <p:cTn id="11" fill="hold">
+                      <p:stCondLst>
+                        <p:cond delay="indefinite"/>
+                      </p:stCondLst>
+                      <p:childTnLst>
+                        <p:par>
+                          <p:cTn id="12" fill="hold">
+                            <p:stCondLst>
+                              <p:cond delay="0"/>
+                            </p:stCondLst>
+                            <p:childTnLst>
+                              <p:par>
+                                <p:cTn id="13" presetID="1" presetClass="entr" presetSubtype="0" fill="hold" grpId="0" nodeType="clickEffect">
+                                  <p:stCondLst>
+                                    <p:cond delay="0"/>
+                                  </p:stCondLst>
+                                  <p:childTnLst>
+                                    <p:set>
+                                      <p:cBhvr>
+                                        <p:cTn id="14" dur="1" fill="hold">
+                                          <p:stCondLst>
+                                            <p:cond delay="0"/>
+                                          </p:stCondLst>
+                                        </p:cTn>
+                                        <p:tgtEl>
+                                          <p:spTgt spid="3">
+                                            <p:txEl>
+                                              <p:pRg st="2" end="2"/>
+                                            </p:txEl>
+                                          </p:spTgt>
+                                        </p:tgtEl>
+                                        <p:attrNameLst>
+                                          <p:attrName>style.visibility</p:attrName>
+                                        </p:attrNameLst>
+                                      </p:cBhvr>
+                                      <p:to>
+                                        <p:strVal val="visible"/>
+                                      </p:to>
+                                    </p:set>
+                                  </p:childTnLst>
+                                </p:cTn>
+                              </p:par>
+                            </p:childTnLst>
+                          </p:cTn>
+                        </p:par>
+                      </p:childTnLst>
+                    </p:cTn>
+                  </p:par>
+                  <p:par>
+                    <p:cTn id="15" fill="hold">
+                      <p:stCondLst>
+                        <p:cond delay="indefinite"/>
+                      </p:stCondLst>
+                      <p:childTnLst>
+                        <p:par>
+                          <p:cTn id="16" fill="hold">
+                            <p:stCondLst>
+                              <p:cond delay="0"/>
+                            </p:stCondLst>
+                            <p:childTnLst>
+                              <p:par>
+                                <p:cTn id="17" presetID="1" presetClass="entr" presetSubtype="0" fill="hold" grpId="0" nodeType="clickEffect">
+                                  <p:stCondLst>
+                                    <p:cond delay="0"/>
+                                  </p:stCondLst>
+                                  <p:childTnLst>
+                                    <p:set>
+                                      <p:cBhvr>
+                                        <p:cTn id="18" dur="1" fill="hold">
+                                          <p:stCondLst>
+                                            <p:cond delay="0"/>
+                                          </p:stCondLst>
+                                        </p:cTn>
+                                        <p:tgtEl>
+                                          <p:spTgt spid="3">
+                                            <p:txEl>
+                                              <p:pRg st="3" end="3"/>
+                                            </p:txEl>
+                                          </p:spTgt>
+                                        </p:tgtEl>
+                                        <p:attrNameLst>
+                                          <p:attrName>style.visibility</p:attrName>
+                                        </p:attrNameLst>
+                                      </p:cBhvr>
+                                      <p:to>
+                                        <p:strVal val="visible"/>
+                                      </p:to>
+                                    </p:set>
+                                  </p:childTnLst>
+                                </p:cTn>
+                              </p:par>
+                            </p:childTnLst>
+                          </p:cTn>
+                        </p:par>
+                      </p:childTnLst>
+                    </p:cTn>
+                  </p:par>
+                </p:childTnLst>
+              </p:cTn>
+              <p:prevCondLst>
+                <p:cond evt="onPrev" delay="0">
+                  <p:tgtEl>
+                    <p:sldTgt/>
+                  </p:tgtEl>
+                </p:cond>
+              </p:prevCondLst>
+              <p:nextCondLst>
+                <p:cond evt="onNext" delay="0">
+                  <p:tgtEl>
+                    <p:sldTgt/>
+                  </p:tgtEl>
+                </p:cond>
+              </p:nextCondLst>
+            </p:seq>
+          </p:childTnLst>
+        </p:cTn>
+      </p:par>
+    </p:tnLst>
+    <p:bldLst>
+      <p:bldP spid="3" grpId="0" uiExpand="1" build="p"/>
+    </p:bldLst>
+  </p:timing>
 </p:sld>
 </file>
 

</xml_diff>